<commit_message>
Updating NUCLEI 2020 presentation
</commit_message>
<xml_diff>
--- a/Presentations/NUCLEI_June2020/tropiano_nuclei_2020.pptx
+++ b/Presentations/NUCLEI_June2020/tropiano_nuclei_2020.pptx
@@ -5,7 +5,7 @@
     <p:sldMasterId id="2147483648" r:id="rId1"/>
   </p:sldMasterIdLst>
   <p:notesMasterIdLst>
-    <p:notesMasterId r:id="rId18"/>
+    <p:notesMasterId r:id="rId23"/>
   </p:notesMasterIdLst>
   <p:sldIdLst>
     <p:sldId id="277" r:id="rId2"/>
@@ -15,15 +15,20 @@
     <p:sldId id="278" r:id="rId6"/>
     <p:sldId id="279" r:id="rId7"/>
     <p:sldId id="272" r:id="rId8"/>
-    <p:sldId id="280" r:id="rId9"/>
-    <p:sldId id="281" r:id="rId10"/>
+    <p:sldId id="302" r:id="rId9"/>
+    <p:sldId id="303" r:id="rId10"/>
     <p:sldId id="273" r:id="rId11"/>
-    <p:sldId id="274" r:id="rId12"/>
-    <p:sldId id="298" r:id="rId13"/>
-    <p:sldId id="299" r:id="rId14"/>
-    <p:sldId id="300" r:id="rId15"/>
-    <p:sldId id="276" r:id="rId16"/>
-    <p:sldId id="301" r:id="rId17"/>
+    <p:sldId id="304" r:id="rId12"/>
+    <p:sldId id="305" r:id="rId13"/>
+    <p:sldId id="274" r:id="rId14"/>
+    <p:sldId id="298" r:id="rId15"/>
+    <p:sldId id="299" r:id="rId16"/>
+    <p:sldId id="300" r:id="rId17"/>
+    <p:sldId id="307" r:id="rId18"/>
+    <p:sldId id="308" r:id="rId19"/>
+    <p:sldId id="276" r:id="rId20"/>
+    <p:sldId id="301" r:id="rId21"/>
+    <p:sldId id="306" r:id="rId22"/>
   </p:sldIdLst>
   <p:sldSz cx="12192000" cy="6858000"/>
   <p:notesSz cx="6858000" cy="9144000"/>
@@ -217,7 +222,7 @@
             <a:fld id="{0A84EC41-ECD6-7F4B-B508-87B276563826}" type="datetimeFigureOut">
               <a:rPr lang="en-US" smtClean="0"/>
               <a:pPr/>
-              <a:t>6/4/20</a:t>
+              <a:t>6/5/20</a:t>
             </a:fld>
             <a:endParaRPr lang="en-US" dirty="0"/>
           </a:p>
@@ -929,7 +934,7 @@
           <a:p>
             <a:fld id="{C752B45F-82BA-0A49-9FDC-DD5F6CBA947D}" type="datetimeFigureOut">
               <a:rPr lang="en-US" smtClean="0"/>
-              <a:t>6/4/20</a:t>
+              <a:t>6/5/20</a:t>
             </a:fld>
             <a:endParaRPr lang="en-US"/>
           </a:p>
@@ -1127,7 +1132,7 @@
           <a:p>
             <a:fld id="{C752B45F-82BA-0A49-9FDC-DD5F6CBA947D}" type="datetimeFigureOut">
               <a:rPr lang="en-US" smtClean="0"/>
-              <a:t>6/4/20</a:t>
+              <a:t>6/5/20</a:t>
             </a:fld>
             <a:endParaRPr lang="en-US"/>
           </a:p>
@@ -1335,7 +1340,7 @@
           <a:p>
             <a:fld id="{C752B45F-82BA-0A49-9FDC-DD5F6CBA947D}" type="datetimeFigureOut">
               <a:rPr lang="en-US" smtClean="0"/>
-              <a:t>6/4/20</a:t>
+              <a:t>6/5/20</a:t>
             </a:fld>
             <a:endParaRPr lang="en-US"/>
           </a:p>
@@ -1533,7 +1538,7 @@
           <a:p>
             <a:fld id="{C752B45F-82BA-0A49-9FDC-DD5F6CBA947D}" type="datetimeFigureOut">
               <a:rPr lang="en-US" smtClean="0"/>
-              <a:t>6/4/20</a:t>
+              <a:t>6/5/20</a:t>
             </a:fld>
             <a:endParaRPr lang="en-US"/>
           </a:p>
@@ -1808,7 +1813,7 @@
           <a:p>
             <a:fld id="{C752B45F-82BA-0A49-9FDC-DD5F6CBA947D}" type="datetimeFigureOut">
               <a:rPr lang="en-US" smtClean="0"/>
-              <a:t>6/4/20</a:t>
+              <a:t>6/5/20</a:t>
             </a:fld>
             <a:endParaRPr lang="en-US"/>
           </a:p>
@@ -2073,7 +2078,7 @@
           <a:p>
             <a:fld id="{C752B45F-82BA-0A49-9FDC-DD5F6CBA947D}" type="datetimeFigureOut">
               <a:rPr lang="en-US" smtClean="0"/>
-              <a:t>6/4/20</a:t>
+              <a:t>6/5/20</a:t>
             </a:fld>
             <a:endParaRPr lang="en-US"/>
           </a:p>
@@ -2485,7 +2490,7 @@
           <a:p>
             <a:fld id="{C752B45F-82BA-0A49-9FDC-DD5F6CBA947D}" type="datetimeFigureOut">
               <a:rPr lang="en-US" smtClean="0"/>
-              <a:t>6/4/20</a:t>
+              <a:t>6/5/20</a:t>
             </a:fld>
             <a:endParaRPr lang="en-US"/>
           </a:p>
@@ -2626,7 +2631,7 @@
           <a:p>
             <a:fld id="{C752B45F-82BA-0A49-9FDC-DD5F6CBA947D}" type="datetimeFigureOut">
               <a:rPr lang="en-US" smtClean="0"/>
-              <a:t>6/4/20</a:t>
+              <a:t>6/5/20</a:t>
             </a:fld>
             <a:endParaRPr lang="en-US"/>
           </a:p>
@@ -2739,7 +2744,7 @@
           <a:p>
             <a:fld id="{C752B45F-82BA-0A49-9FDC-DD5F6CBA947D}" type="datetimeFigureOut">
               <a:rPr lang="en-US" smtClean="0"/>
-              <a:t>6/4/20</a:t>
+              <a:t>6/5/20</a:t>
             </a:fld>
             <a:endParaRPr lang="en-US"/>
           </a:p>
@@ -3050,7 +3055,7 @@
           <a:p>
             <a:fld id="{C752B45F-82BA-0A49-9FDC-DD5F6CBA947D}" type="datetimeFigureOut">
               <a:rPr lang="en-US" smtClean="0"/>
-              <a:t>6/4/20</a:t>
+              <a:t>6/5/20</a:t>
             </a:fld>
             <a:endParaRPr lang="en-US"/>
           </a:p>
@@ -3341,7 +3346,7 @@
           <a:p>
             <a:fld id="{C752B45F-82BA-0A49-9FDC-DD5F6CBA947D}" type="datetimeFigureOut">
               <a:rPr lang="en-US" smtClean="0"/>
-              <a:t>6/4/20</a:t>
+              <a:t>6/5/20</a:t>
             </a:fld>
             <a:endParaRPr lang="en-US"/>
           </a:p>
@@ -3586,7 +3591,7 @@
             <a:fld id="{C752B45F-82BA-0A49-9FDC-DD5F6CBA947D}" type="datetimeFigureOut">
               <a:rPr lang="en-US" smtClean="0"/>
               <a:pPr/>
-              <a:t>6/4/20</a:t>
+              <a:t>6/5/20</a:t>
             </a:fld>
             <a:endParaRPr lang="en-US" dirty="0"/>
           </a:p>
@@ -4530,99 +4535,266 @@
           </a:p>
         </p:txBody>
       </p:sp>
-      <p:sp>
-        <p:nvSpPr>
-          <p:cNvPr id="3" name="Content Placeholder 2">
-            <a:extLst>
-              <a:ext uri="{FF2B5EF4-FFF2-40B4-BE49-F238E27FC236}">
-                <a16:creationId xmlns:a16="http://schemas.microsoft.com/office/drawing/2014/main" id="{1A8FA9B3-1B32-894B-93C2-F90FB63CBDAA}"/>
-              </a:ext>
-            </a:extLst>
-          </p:cNvPr>
-          <p:cNvSpPr>
-            <a:spLocks noGrp="1"/>
-          </p:cNvSpPr>
-          <p:nvPr>
-            <p:ph idx="1"/>
-          </p:nvPr>
-        </p:nvSpPr>
-        <p:spPr/>
-        <p:txBody>
-          <a:bodyPr/>
-          <a:lstStyle/>
-          <a:p>
-            <a:pPr>
-              <a:lnSpc>
-                <a:spcPct val="100000"/>
-              </a:lnSpc>
-            </a:pPr>
-            <a:r>
-              <a:rPr lang="en-US" dirty="0">
-                <a:latin typeface="Arial" panose="020B0604020202020204" pitchFamily="34" charset="0"/>
-              </a:rPr>
-              <a:t>In analyzing scattering observables, there is scale and scheme dependence in factorization of structure and reaction</a:t>
-            </a:r>
-          </a:p>
-          <a:p>
-            <a:pPr lvl="1">
-              <a:lnSpc>
-                <a:spcPct val="100000"/>
-              </a:lnSpc>
-            </a:pPr>
-            <a:r>
-              <a:rPr lang="en-US" dirty="0"/>
-              <a:t>Factorization scale \</a:t>
-            </a:r>
-            <a:r>
-              <a:rPr lang="en-US" dirty="0" err="1"/>
-              <a:t>mu_F</a:t>
-            </a:r>
-            <a:r>
-              <a:rPr lang="en-US" dirty="0"/>
-              <a:t> and scheme</a:t>
-            </a:r>
-            <a:endParaRPr lang="en-US" dirty="0">
-              <a:latin typeface="Arial" panose="020B0604020202020204" pitchFamily="34" charset="0"/>
-            </a:endParaRPr>
-          </a:p>
-          <a:p>
-            <a:pPr>
-              <a:lnSpc>
-                <a:spcPct val="100000"/>
-              </a:lnSpc>
-            </a:pPr>
-            <a:r>
-              <a:rPr lang="en-US" dirty="0"/>
-              <a:t>Can tune the scale with SRG transformations making a potential with SRC physics like AV18 much softer like a high-order chiral potential</a:t>
-            </a:r>
-          </a:p>
-          <a:p>
-            <a:pPr>
-              <a:lnSpc>
-                <a:spcPct val="100000"/>
-              </a:lnSpc>
-            </a:pPr>
-            <a:r>
-              <a:rPr lang="en-US" dirty="0"/>
-              <a:t>Can use low-energy structure to calculate high-energy reactions by consistently evolving the reactions part</a:t>
-            </a:r>
-          </a:p>
-          <a:p>
-            <a:pPr>
-              <a:lnSpc>
-                <a:spcPct val="100000"/>
-              </a:lnSpc>
-            </a:pPr>
-            <a:r>
-              <a:rPr lang="en-US" dirty="0"/>
-              <a:t>Mismatch of scales leads to incorrect observable</a:t>
-            </a:r>
-            <a:endParaRPr lang="en-US" dirty="0">
-              <a:latin typeface="Arial" panose="020B0604020202020204" pitchFamily="34" charset="0"/>
-            </a:endParaRPr>
-          </a:p>
-        </p:txBody>
-      </p:sp>
+      <mc:AlternateContent xmlns:mc="http://schemas.openxmlformats.org/markup-compatibility/2006">
+        <mc:Choice xmlns:a14="http://schemas.microsoft.com/office/drawing/2010/main" Requires="a14">
+          <p:sp>
+            <p:nvSpPr>
+              <p:cNvPr id="3" name="Content Placeholder 2">
+                <a:extLst>
+                  <a:ext uri="{FF2B5EF4-FFF2-40B4-BE49-F238E27FC236}">
+                    <a16:creationId xmlns:a16="http://schemas.microsoft.com/office/drawing/2014/main" id="{1A8FA9B3-1B32-894B-93C2-F90FB63CBDAA}"/>
+                  </a:ext>
+                </a:extLst>
+              </p:cNvPr>
+              <p:cNvSpPr>
+                <a:spLocks noGrp="1"/>
+              </p:cNvSpPr>
+              <p:nvPr>
+                <p:ph idx="1"/>
+              </p:nvPr>
+            </p:nvSpPr>
+            <p:spPr/>
+            <p:txBody>
+              <a:bodyPr/>
+              <a:lstStyle/>
+              <a:p>
+                <a:pPr>
+                  <a:lnSpc>
+                    <a:spcPct val="100000"/>
+                  </a:lnSpc>
+                </a:pPr>
+                <a:r>
+                  <a:rPr lang="en-US" dirty="0">
+                    <a:latin typeface="Arial" panose="020B0604020202020204" pitchFamily="34" charset="0"/>
+                  </a:rPr>
+                  <a:t>In analyzing scattering observables, there is scale and scheme dependence in factorization of structure and reaction</a:t>
+                </a:r>
+              </a:p>
+              <a:p>
+                <a:pPr lvl="1">
+                  <a:lnSpc>
+                    <a:spcPct val="100000"/>
+                  </a:lnSpc>
+                </a:pPr>
+                <a:r>
+                  <a:rPr lang="en-US" dirty="0"/>
+                  <a:t>Factorization scale \</a:t>
+                </a:r>
+                <a:r>
+                  <a:rPr lang="en-US" dirty="0" err="1"/>
+                  <a:t>mu_F</a:t>
+                </a:r>
+                <a:r>
+                  <a:rPr lang="en-US" dirty="0"/>
+                  <a:t> and scheme</a:t>
+                </a:r>
+              </a:p>
+              <a:p>
+                <a:pPr>
+                  <a:lnSpc>
+                    <a:spcPct val="100000"/>
+                  </a:lnSpc>
+                </a:pPr>
+                <a:r>
+                  <a:rPr lang="en-US" dirty="0">
+                    <a:latin typeface="Arial" panose="020B0604020202020204" pitchFamily="34" charset="0"/>
+                  </a:rPr>
+                  <a:t>Analogous </a:t>
+                </a:r>
+                <a:r>
+                  <a:rPr lang="en-US" dirty="0"/>
+                  <a:t>problem </a:t>
+                </a:r>
+                <a14:m>
+                  <m:oMath xmlns:m="http://schemas.openxmlformats.org/officeDocument/2006/math">
+                    <m:d>
+                      <m:dPr>
+                        <m:begChr m:val="⟨"/>
+                        <m:endChr m:val="⟩"/>
+                        <m:ctrlPr>
+                          <a:rPr lang="en-US" i="1" smtClean="0">
+                            <a:latin typeface="Cambria Math" panose="02040503050406030204" pitchFamily="18" charset="0"/>
+                          </a:rPr>
+                        </m:ctrlPr>
+                      </m:dPr>
+                      <m:e>
+                        <m:r>
+                          <a:rPr lang="en-US" i="1" smtClean="0">
+                            <a:latin typeface="Cambria Math" panose="02040503050406030204" pitchFamily="18" charset="0"/>
+                            <a:ea typeface="Cambria Math" panose="02040503050406030204" pitchFamily="18" charset="0"/>
+                          </a:rPr>
+                          <m:t>𝜓</m:t>
+                        </m:r>
+                      </m:e>
+                      <m:e>
+                        <m:r>
+                          <a:rPr lang="en-US" b="0" i="1" smtClean="0">
+                            <a:latin typeface="Cambria Math" panose="02040503050406030204" pitchFamily="18" charset="0"/>
+                          </a:rPr>
+                          <m:t>𝑂</m:t>
+                        </m:r>
+                      </m:e>
+                      <m:e>
+                        <m:r>
+                          <a:rPr lang="en-US" i="1" smtClean="0">
+                            <a:latin typeface="Cambria Math" panose="02040503050406030204" pitchFamily="18" charset="0"/>
+                            <a:ea typeface="Cambria Math" panose="02040503050406030204" pitchFamily="18" charset="0"/>
+                          </a:rPr>
+                          <m:t>𝜓</m:t>
+                        </m:r>
+                      </m:e>
+                    </m:d>
+                  </m:oMath>
+                </a14:m>
+                <a:endParaRPr lang="en-US" dirty="0">
+                  <a:latin typeface="Arial" panose="020B0604020202020204" pitchFamily="34" charset="0"/>
+                </a:endParaRPr>
+              </a:p>
+              <a:p>
+                <a:pPr>
+                  <a:lnSpc>
+                    <a:spcPct val="100000"/>
+                  </a:lnSpc>
+                </a:pPr>
+                <a:r>
+                  <a:rPr lang="en-US" dirty="0"/>
+                  <a:t>Can tune the scale with SRG transformations making a potential with SRC physics like AV18 much softer like a high-order chiral potential</a:t>
+                </a:r>
+              </a:p>
+              <a:p>
+                <a:pPr>
+                  <a:lnSpc>
+                    <a:spcPct val="100000"/>
+                  </a:lnSpc>
+                </a:pPr>
+                <a:r>
+                  <a:rPr lang="en-US" dirty="0"/>
+                  <a:t>Can use low-energy structure </a:t>
+                </a:r>
+                <a14:m>
+                  <m:oMath xmlns:m="http://schemas.openxmlformats.org/officeDocument/2006/math">
+                    <m:sSub>
+                      <m:sSubPr>
+                        <m:ctrlPr>
+                          <a:rPr lang="en-US" i="1" smtClean="0">
+                            <a:latin typeface="Cambria Math" panose="02040503050406030204" pitchFamily="18" charset="0"/>
+                          </a:rPr>
+                        </m:ctrlPr>
+                      </m:sSubPr>
+                      <m:e>
+                        <m:r>
+                          <a:rPr lang="en-US" i="1" smtClean="0">
+                            <a:latin typeface="Cambria Math" panose="02040503050406030204" pitchFamily="18" charset="0"/>
+                            <a:ea typeface="Cambria Math" panose="02040503050406030204" pitchFamily="18" charset="0"/>
+                          </a:rPr>
+                          <m:t>𝜓</m:t>
+                        </m:r>
+                      </m:e>
+                      <m:sub>
+                        <m:r>
+                          <a:rPr lang="en-US" i="1" smtClean="0">
+                            <a:latin typeface="Cambria Math" panose="02040503050406030204" pitchFamily="18" charset="0"/>
+                            <a:ea typeface="Cambria Math" panose="02040503050406030204" pitchFamily="18" charset="0"/>
+                          </a:rPr>
+                          <m:t>𝜆</m:t>
+                        </m:r>
+                      </m:sub>
+                    </m:sSub>
+                  </m:oMath>
+                </a14:m>
+                <a:r>
+                  <a:rPr lang="en-US" dirty="0"/>
+                  <a:t> to calculate high-energy reactions by consistently evolving the reactions part </a:t>
+                </a:r>
+                <a14:m>
+                  <m:oMath xmlns:m="http://schemas.openxmlformats.org/officeDocument/2006/math">
+                    <m:sSub>
+                      <m:sSubPr>
+                        <m:ctrlPr>
+                          <a:rPr lang="en-US" i="1" smtClean="0">
+                            <a:latin typeface="Cambria Math" panose="02040503050406030204" pitchFamily="18" charset="0"/>
+                          </a:rPr>
+                        </m:ctrlPr>
+                      </m:sSubPr>
+                      <m:e>
+                        <m:r>
+                          <a:rPr lang="en-US" b="0" i="1" smtClean="0">
+                            <a:latin typeface="Cambria Math" panose="02040503050406030204" pitchFamily="18" charset="0"/>
+                          </a:rPr>
+                          <m:t>𝑂</m:t>
+                        </m:r>
+                      </m:e>
+                      <m:sub>
+                        <m:r>
+                          <a:rPr lang="en-US" i="1" smtClean="0">
+                            <a:latin typeface="Cambria Math" panose="02040503050406030204" pitchFamily="18" charset="0"/>
+                            <a:ea typeface="Cambria Math" panose="02040503050406030204" pitchFamily="18" charset="0"/>
+                          </a:rPr>
+                          <m:t>𝜆</m:t>
+                        </m:r>
+                      </m:sub>
+                    </m:sSub>
+                  </m:oMath>
+                </a14:m>
+                <a:endParaRPr lang="en-US" dirty="0"/>
+              </a:p>
+              <a:p>
+                <a:pPr>
+                  <a:lnSpc>
+                    <a:spcPct val="100000"/>
+                  </a:lnSpc>
+                </a:pPr>
+                <a:r>
+                  <a:rPr lang="en-US" dirty="0"/>
+                  <a:t>Mismatch of scales leads to incorrect observable</a:t>
+                </a:r>
+                <a:endParaRPr lang="en-US" dirty="0">
+                  <a:latin typeface="Arial" panose="020B0604020202020204" pitchFamily="34" charset="0"/>
+                </a:endParaRPr>
+              </a:p>
+            </p:txBody>
+          </p:sp>
+        </mc:Choice>
+        <mc:Fallback>
+          <p:sp>
+            <p:nvSpPr>
+              <p:cNvPr id="3" name="Content Placeholder 2">
+                <a:extLst>
+                  <a:ext uri="{FF2B5EF4-FFF2-40B4-BE49-F238E27FC236}">
+                    <a16:creationId xmlns:a16="http://schemas.microsoft.com/office/drawing/2014/main" id="{1A8FA9B3-1B32-894B-93C2-F90FB63CBDAA}"/>
+                  </a:ext>
+                </a:extLst>
+              </p:cNvPr>
+              <p:cNvSpPr>
+                <a:spLocks noGrp="1" noRot="1" noChangeAspect="1" noMove="1" noResize="1" noEditPoints="1" noAdjustHandles="1" noChangeArrowheads="1" noChangeShapeType="1" noTextEdit="1"/>
+              </p:cNvSpPr>
+              <p:nvPr>
+                <p:ph idx="1"/>
+              </p:nvPr>
+            </p:nvSpPr>
+            <p:spPr>
+              <a:blipFill>
+                <a:blip r:embed="rId2"/>
+                <a:stretch>
+                  <a:fillRect l="-965" t="-1754" r="-121" b="-15789"/>
+                </a:stretch>
+              </a:blipFill>
+            </p:spPr>
+            <p:txBody>
+              <a:bodyPr/>
+              <a:lstStyle/>
+              <a:p>
+                <a:r>
+                  <a:rPr lang="en-US">
+                    <a:noFill/>
+                  </a:rPr>
+                  <a:t> </a:t>
+                </a:r>
+              </a:p>
+            </p:txBody>
+          </p:sp>
+        </mc:Fallback>
+      </mc:AlternateContent>
     </p:spTree>
     <p:extLst>
       <p:ext uri="{BB962C8B-B14F-4D97-AF65-F5344CB8AC3E}">
@@ -4671,6 +4843,662 @@
         </p:nvSpPr>
         <p:spPr/>
         <p:txBody>
+          <a:bodyPr/>
+          <a:lstStyle/>
+          <a:p>
+            <a:pPr>
+              <a:lnSpc>
+                <a:spcPct val="100000"/>
+              </a:lnSpc>
+            </a:pPr>
+            <a:r>
+              <a:rPr lang="en-US" dirty="0">
+                <a:solidFill>
+                  <a:srgbClr val="002060"/>
+                </a:solidFill>
+                <a:latin typeface="Arial" panose="020B0604020202020204" pitchFamily="34" charset="0"/>
+              </a:rPr>
+              <a:t>Connection to experiments</a:t>
+            </a:r>
+          </a:p>
+        </p:txBody>
+      </p:sp>
+      <mc:AlternateContent xmlns:mc="http://schemas.openxmlformats.org/markup-compatibility/2006">
+        <mc:Choice xmlns:a14="http://schemas.microsoft.com/office/drawing/2010/main" Requires="a14">
+          <p:sp>
+            <p:nvSpPr>
+              <p:cNvPr id="3" name="Content Placeholder 2">
+                <a:extLst>
+                  <a:ext uri="{FF2B5EF4-FFF2-40B4-BE49-F238E27FC236}">
+                    <a16:creationId xmlns:a16="http://schemas.microsoft.com/office/drawing/2014/main" id="{1A8FA9B3-1B32-894B-93C2-F90FB63CBDAA}"/>
+                  </a:ext>
+                </a:extLst>
+              </p:cNvPr>
+              <p:cNvSpPr>
+                <a:spLocks noGrp="1"/>
+              </p:cNvSpPr>
+              <p:nvPr>
+                <p:ph idx="1"/>
+              </p:nvPr>
+            </p:nvSpPr>
+            <p:spPr/>
+            <p:txBody>
+              <a:bodyPr/>
+              <a:lstStyle/>
+              <a:p>
+                <a:pPr>
+                  <a:lnSpc>
+                    <a:spcPct val="100000"/>
+                  </a:lnSpc>
+                </a:pPr>
+                <a:r>
+                  <a:rPr lang="en-US" dirty="0">
+                    <a:latin typeface="Arial" panose="020B0604020202020204" pitchFamily="34" charset="0"/>
+                  </a:rPr>
+                  <a:t>In analyzing scattering observables, there is scale and scheme dependence in factorization of structure and reaction</a:t>
+                </a:r>
+              </a:p>
+              <a:p>
+                <a:pPr lvl="1">
+                  <a:lnSpc>
+                    <a:spcPct val="100000"/>
+                  </a:lnSpc>
+                </a:pPr>
+                <a:r>
+                  <a:rPr lang="en-US" dirty="0"/>
+                  <a:t>Factorization scale \</a:t>
+                </a:r>
+                <a:r>
+                  <a:rPr lang="en-US" dirty="0" err="1"/>
+                  <a:t>mu_F</a:t>
+                </a:r>
+                <a:r>
+                  <a:rPr lang="en-US" dirty="0"/>
+                  <a:t> and scheme</a:t>
+                </a:r>
+              </a:p>
+              <a:p>
+                <a:pPr>
+                  <a:lnSpc>
+                    <a:spcPct val="100000"/>
+                  </a:lnSpc>
+                </a:pPr>
+                <a:r>
+                  <a:rPr lang="en-US" dirty="0">
+                    <a:latin typeface="Arial" panose="020B0604020202020204" pitchFamily="34" charset="0"/>
+                  </a:rPr>
+                  <a:t>Analogous </a:t>
+                </a:r>
+                <a:r>
+                  <a:rPr lang="en-US" dirty="0"/>
+                  <a:t>problem </a:t>
+                </a:r>
+                <a14:m>
+                  <m:oMath xmlns:m="http://schemas.openxmlformats.org/officeDocument/2006/math">
+                    <m:d>
+                      <m:dPr>
+                        <m:begChr m:val="⟨"/>
+                        <m:endChr m:val="⟩"/>
+                        <m:ctrlPr>
+                          <a:rPr lang="en-US" i="1" smtClean="0">
+                            <a:latin typeface="Cambria Math" panose="02040503050406030204" pitchFamily="18" charset="0"/>
+                          </a:rPr>
+                        </m:ctrlPr>
+                      </m:dPr>
+                      <m:e>
+                        <m:r>
+                          <a:rPr lang="en-US" i="1" smtClean="0">
+                            <a:latin typeface="Cambria Math" panose="02040503050406030204" pitchFamily="18" charset="0"/>
+                            <a:ea typeface="Cambria Math" panose="02040503050406030204" pitchFamily="18" charset="0"/>
+                          </a:rPr>
+                          <m:t>𝜓</m:t>
+                        </m:r>
+                      </m:e>
+                      <m:e>
+                        <m:r>
+                          <a:rPr lang="en-US" b="0" i="1" smtClean="0">
+                            <a:latin typeface="Cambria Math" panose="02040503050406030204" pitchFamily="18" charset="0"/>
+                          </a:rPr>
+                          <m:t>𝑂</m:t>
+                        </m:r>
+                      </m:e>
+                      <m:e>
+                        <m:r>
+                          <a:rPr lang="en-US" i="1" smtClean="0">
+                            <a:latin typeface="Cambria Math" panose="02040503050406030204" pitchFamily="18" charset="0"/>
+                            <a:ea typeface="Cambria Math" panose="02040503050406030204" pitchFamily="18" charset="0"/>
+                          </a:rPr>
+                          <m:t>𝜓</m:t>
+                        </m:r>
+                      </m:e>
+                    </m:d>
+                  </m:oMath>
+                </a14:m>
+                <a:endParaRPr lang="en-US" dirty="0">
+                  <a:latin typeface="Arial" panose="020B0604020202020204" pitchFamily="34" charset="0"/>
+                </a:endParaRPr>
+              </a:p>
+              <a:p>
+                <a:pPr>
+                  <a:lnSpc>
+                    <a:spcPct val="100000"/>
+                  </a:lnSpc>
+                </a:pPr>
+                <a:r>
+                  <a:rPr lang="en-US" dirty="0"/>
+                  <a:t>Can tune the scale with SRG transformations making a potential with SRC physics like AV18 much softer like a high-order chiral potential</a:t>
+                </a:r>
+              </a:p>
+              <a:p>
+                <a:pPr>
+                  <a:lnSpc>
+                    <a:spcPct val="100000"/>
+                  </a:lnSpc>
+                </a:pPr>
+                <a:r>
+                  <a:rPr lang="en-US" dirty="0"/>
+                  <a:t>Can use low-energy structure </a:t>
+                </a:r>
+                <a14:m>
+                  <m:oMath xmlns:m="http://schemas.openxmlformats.org/officeDocument/2006/math">
+                    <m:sSub>
+                      <m:sSubPr>
+                        <m:ctrlPr>
+                          <a:rPr lang="en-US" i="1" smtClean="0">
+                            <a:latin typeface="Cambria Math" panose="02040503050406030204" pitchFamily="18" charset="0"/>
+                          </a:rPr>
+                        </m:ctrlPr>
+                      </m:sSubPr>
+                      <m:e>
+                        <m:r>
+                          <a:rPr lang="en-US" i="1" smtClean="0">
+                            <a:latin typeface="Cambria Math" panose="02040503050406030204" pitchFamily="18" charset="0"/>
+                            <a:ea typeface="Cambria Math" panose="02040503050406030204" pitchFamily="18" charset="0"/>
+                          </a:rPr>
+                          <m:t>𝜓</m:t>
+                        </m:r>
+                      </m:e>
+                      <m:sub>
+                        <m:r>
+                          <a:rPr lang="en-US" i="1" smtClean="0">
+                            <a:latin typeface="Cambria Math" panose="02040503050406030204" pitchFamily="18" charset="0"/>
+                            <a:ea typeface="Cambria Math" panose="02040503050406030204" pitchFamily="18" charset="0"/>
+                          </a:rPr>
+                          <m:t>𝜆</m:t>
+                        </m:r>
+                      </m:sub>
+                    </m:sSub>
+                  </m:oMath>
+                </a14:m>
+                <a:r>
+                  <a:rPr lang="en-US" dirty="0"/>
+                  <a:t> to calculate high-energy reactions by consistently evolving the reactions part </a:t>
+                </a:r>
+                <a14:m>
+                  <m:oMath xmlns:m="http://schemas.openxmlformats.org/officeDocument/2006/math">
+                    <m:sSub>
+                      <m:sSubPr>
+                        <m:ctrlPr>
+                          <a:rPr lang="en-US" i="1" smtClean="0">
+                            <a:latin typeface="Cambria Math" panose="02040503050406030204" pitchFamily="18" charset="0"/>
+                          </a:rPr>
+                        </m:ctrlPr>
+                      </m:sSubPr>
+                      <m:e>
+                        <m:r>
+                          <a:rPr lang="en-US" b="0" i="1" smtClean="0">
+                            <a:latin typeface="Cambria Math" panose="02040503050406030204" pitchFamily="18" charset="0"/>
+                          </a:rPr>
+                          <m:t>𝑂</m:t>
+                        </m:r>
+                      </m:e>
+                      <m:sub>
+                        <m:r>
+                          <a:rPr lang="en-US" i="1" smtClean="0">
+                            <a:latin typeface="Cambria Math" panose="02040503050406030204" pitchFamily="18" charset="0"/>
+                            <a:ea typeface="Cambria Math" panose="02040503050406030204" pitchFamily="18" charset="0"/>
+                          </a:rPr>
+                          <m:t>𝜆</m:t>
+                        </m:r>
+                      </m:sub>
+                    </m:sSub>
+                  </m:oMath>
+                </a14:m>
+                <a:endParaRPr lang="en-US" dirty="0"/>
+              </a:p>
+              <a:p>
+                <a:pPr>
+                  <a:lnSpc>
+                    <a:spcPct val="100000"/>
+                  </a:lnSpc>
+                </a:pPr>
+                <a:r>
+                  <a:rPr lang="en-US" dirty="0"/>
+                  <a:t>Mismatch of scales leads to incorrect observable</a:t>
+                </a:r>
+                <a:endParaRPr lang="en-US" dirty="0">
+                  <a:latin typeface="Arial" panose="020B0604020202020204" pitchFamily="34" charset="0"/>
+                </a:endParaRPr>
+              </a:p>
+            </p:txBody>
+          </p:sp>
+        </mc:Choice>
+        <mc:Fallback>
+          <p:sp>
+            <p:nvSpPr>
+              <p:cNvPr id="3" name="Content Placeholder 2">
+                <a:extLst>
+                  <a:ext uri="{FF2B5EF4-FFF2-40B4-BE49-F238E27FC236}">
+                    <a16:creationId xmlns:a16="http://schemas.microsoft.com/office/drawing/2014/main" id="{1A8FA9B3-1B32-894B-93C2-F90FB63CBDAA}"/>
+                  </a:ext>
+                </a:extLst>
+              </p:cNvPr>
+              <p:cNvSpPr>
+                <a:spLocks noGrp="1" noRot="1" noChangeAspect="1" noMove="1" noResize="1" noEditPoints="1" noAdjustHandles="1" noChangeArrowheads="1" noChangeShapeType="1" noTextEdit="1"/>
+              </p:cNvSpPr>
+              <p:nvPr>
+                <p:ph idx="1"/>
+              </p:nvPr>
+            </p:nvSpPr>
+            <p:spPr>
+              <a:blipFill>
+                <a:blip r:embed="rId2"/>
+                <a:stretch>
+                  <a:fillRect l="-965" t="-1754" r="-121" b="-15789"/>
+                </a:stretch>
+              </a:blipFill>
+            </p:spPr>
+            <p:txBody>
+              <a:bodyPr/>
+              <a:lstStyle/>
+              <a:p>
+                <a:r>
+                  <a:rPr lang="en-US">
+                    <a:noFill/>
+                  </a:rPr>
+                  <a:t> </a:t>
+                </a:r>
+              </a:p>
+            </p:txBody>
+          </p:sp>
+        </mc:Fallback>
+      </mc:AlternateContent>
+    </p:spTree>
+    <p:extLst>
+      <p:ext uri="{BB962C8B-B14F-4D97-AF65-F5344CB8AC3E}">
+        <p14:creationId xmlns:p14="http://schemas.microsoft.com/office/powerpoint/2010/main" val="3113682996"/>
+      </p:ext>
+    </p:extLst>
+  </p:cSld>
+  <p:clrMapOvr>
+    <a:masterClrMapping/>
+  </p:clrMapOvr>
+</p:sld>
+</file>
+
+<file path=ppt/slides/slide12.xml><?xml version="1.0" encoding="utf-8"?>
+<p:sld xmlns:a="http://schemas.openxmlformats.org/drawingml/2006/main" xmlns:r="http://schemas.openxmlformats.org/officeDocument/2006/relationships" xmlns:p="http://schemas.openxmlformats.org/presentationml/2006/main">
+  <p:cSld>
+    <p:spTree>
+      <p:nvGrpSpPr>
+        <p:cNvPr id="1" name=""/>
+        <p:cNvGrpSpPr/>
+        <p:nvPr/>
+      </p:nvGrpSpPr>
+      <p:grpSpPr>
+        <a:xfrm>
+          <a:off x="0" y="0"/>
+          <a:ext cx="0" cy="0"/>
+          <a:chOff x="0" y="0"/>
+          <a:chExt cx="0" cy="0"/>
+        </a:xfrm>
+      </p:grpSpPr>
+      <p:sp>
+        <p:nvSpPr>
+          <p:cNvPr id="2" name="Title 1">
+            <a:extLst>
+              <a:ext uri="{FF2B5EF4-FFF2-40B4-BE49-F238E27FC236}">
+                <a16:creationId xmlns:a16="http://schemas.microsoft.com/office/drawing/2014/main" id="{9FECE9C7-FBB0-B54D-8E92-C3BC6CA96ED2}"/>
+              </a:ext>
+            </a:extLst>
+          </p:cNvPr>
+          <p:cNvSpPr>
+            <a:spLocks noGrp="1"/>
+          </p:cNvSpPr>
+          <p:nvPr>
+            <p:ph type="title"/>
+          </p:nvPr>
+        </p:nvSpPr>
+        <p:spPr/>
+        <p:txBody>
+          <a:bodyPr/>
+          <a:lstStyle/>
+          <a:p>
+            <a:pPr>
+              <a:lnSpc>
+                <a:spcPct val="100000"/>
+              </a:lnSpc>
+            </a:pPr>
+            <a:r>
+              <a:rPr lang="en-US" dirty="0">
+                <a:solidFill>
+                  <a:srgbClr val="002060"/>
+                </a:solidFill>
+                <a:latin typeface="Arial" panose="020B0604020202020204" pitchFamily="34" charset="0"/>
+              </a:rPr>
+              <a:t>Connection to experiments</a:t>
+            </a:r>
+          </a:p>
+        </p:txBody>
+      </p:sp>
+      <mc:AlternateContent xmlns:mc="http://schemas.openxmlformats.org/markup-compatibility/2006">
+        <mc:Choice xmlns:a14="http://schemas.microsoft.com/office/drawing/2010/main" Requires="a14">
+          <p:sp>
+            <p:nvSpPr>
+              <p:cNvPr id="3" name="Content Placeholder 2">
+                <a:extLst>
+                  <a:ext uri="{FF2B5EF4-FFF2-40B4-BE49-F238E27FC236}">
+                    <a16:creationId xmlns:a16="http://schemas.microsoft.com/office/drawing/2014/main" id="{1A8FA9B3-1B32-894B-93C2-F90FB63CBDAA}"/>
+                  </a:ext>
+                </a:extLst>
+              </p:cNvPr>
+              <p:cNvSpPr>
+                <a:spLocks noGrp="1"/>
+              </p:cNvSpPr>
+              <p:nvPr>
+                <p:ph idx="1"/>
+              </p:nvPr>
+            </p:nvSpPr>
+            <p:spPr/>
+            <p:txBody>
+              <a:bodyPr/>
+              <a:lstStyle/>
+              <a:p>
+                <a:pPr>
+                  <a:lnSpc>
+                    <a:spcPct val="100000"/>
+                  </a:lnSpc>
+                </a:pPr>
+                <a:r>
+                  <a:rPr lang="en-US" dirty="0">
+                    <a:latin typeface="Arial" panose="020B0604020202020204" pitchFamily="34" charset="0"/>
+                  </a:rPr>
+                  <a:t>In analyzing scattering observables, there is scale and scheme dependence in factorization of structure and reaction</a:t>
+                </a:r>
+              </a:p>
+              <a:p>
+                <a:pPr lvl="1">
+                  <a:lnSpc>
+                    <a:spcPct val="100000"/>
+                  </a:lnSpc>
+                </a:pPr>
+                <a:r>
+                  <a:rPr lang="en-US" dirty="0"/>
+                  <a:t>Factorization scale \</a:t>
+                </a:r>
+                <a:r>
+                  <a:rPr lang="en-US" dirty="0" err="1"/>
+                  <a:t>mu_F</a:t>
+                </a:r>
+                <a:r>
+                  <a:rPr lang="en-US" dirty="0"/>
+                  <a:t> and scheme</a:t>
+                </a:r>
+              </a:p>
+              <a:p>
+                <a:pPr>
+                  <a:lnSpc>
+                    <a:spcPct val="100000"/>
+                  </a:lnSpc>
+                </a:pPr>
+                <a:r>
+                  <a:rPr lang="en-US" dirty="0">
+                    <a:latin typeface="Arial" panose="020B0604020202020204" pitchFamily="34" charset="0"/>
+                  </a:rPr>
+                  <a:t>Analogous </a:t>
+                </a:r>
+                <a:r>
+                  <a:rPr lang="en-US" dirty="0"/>
+                  <a:t>problem </a:t>
+                </a:r>
+                <a14:m>
+                  <m:oMath xmlns:m="http://schemas.openxmlformats.org/officeDocument/2006/math">
+                    <m:d>
+                      <m:dPr>
+                        <m:begChr m:val="⟨"/>
+                        <m:endChr m:val="⟩"/>
+                        <m:ctrlPr>
+                          <a:rPr lang="en-US" i="1" smtClean="0">
+                            <a:latin typeface="Cambria Math" panose="02040503050406030204" pitchFamily="18" charset="0"/>
+                          </a:rPr>
+                        </m:ctrlPr>
+                      </m:dPr>
+                      <m:e>
+                        <m:r>
+                          <a:rPr lang="en-US" i="1" smtClean="0">
+                            <a:latin typeface="Cambria Math" panose="02040503050406030204" pitchFamily="18" charset="0"/>
+                            <a:ea typeface="Cambria Math" panose="02040503050406030204" pitchFamily="18" charset="0"/>
+                          </a:rPr>
+                          <m:t>𝜓</m:t>
+                        </m:r>
+                      </m:e>
+                      <m:e>
+                        <m:r>
+                          <a:rPr lang="en-US" b="0" i="1" smtClean="0">
+                            <a:latin typeface="Cambria Math" panose="02040503050406030204" pitchFamily="18" charset="0"/>
+                          </a:rPr>
+                          <m:t>𝑂</m:t>
+                        </m:r>
+                      </m:e>
+                      <m:e>
+                        <m:r>
+                          <a:rPr lang="en-US" i="1" smtClean="0">
+                            <a:latin typeface="Cambria Math" panose="02040503050406030204" pitchFamily="18" charset="0"/>
+                            <a:ea typeface="Cambria Math" panose="02040503050406030204" pitchFamily="18" charset="0"/>
+                          </a:rPr>
+                          <m:t>𝜓</m:t>
+                        </m:r>
+                      </m:e>
+                    </m:d>
+                  </m:oMath>
+                </a14:m>
+                <a:endParaRPr lang="en-US" dirty="0">
+                  <a:latin typeface="Arial" panose="020B0604020202020204" pitchFamily="34" charset="0"/>
+                </a:endParaRPr>
+              </a:p>
+              <a:p>
+                <a:pPr>
+                  <a:lnSpc>
+                    <a:spcPct val="100000"/>
+                  </a:lnSpc>
+                </a:pPr>
+                <a:r>
+                  <a:rPr lang="en-US" dirty="0"/>
+                  <a:t>Can tune the scale with SRG transformations making a potential with SRC physics like AV18 much softer like a high-order chiral potential</a:t>
+                </a:r>
+              </a:p>
+              <a:p>
+                <a:pPr>
+                  <a:lnSpc>
+                    <a:spcPct val="100000"/>
+                  </a:lnSpc>
+                </a:pPr>
+                <a:r>
+                  <a:rPr lang="en-US" dirty="0"/>
+                  <a:t>Can use low-energy structure </a:t>
+                </a:r>
+                <a14:m>
+                  <m:oMath xmlns:m="http://schemas.openxmlformats.org/officeDocument/2006/math">
+                    <m:sSub>
+                      <m:sSubPr>
+                        <m:ctrlPr>
+                          <a:rPr lang="en-US" i="1" smtClean="0">
+                            <a:latin typeface="Cambria Math" panose="02040503050406030204" pitchFamily="18" charset="0"/>
+                          </a:rPr>
+                        </m:ctrlPr>
+                      </m:sSubPr>
+                      <m:e>
+                        <m:r>
+                          <a:rPr lang="en-US" i="1" smtClean="0">
+                            <a:latin typeface="Cambria Math" panose="02040503050406030204" pitchFamily="18" charset="0"/>
+                            <a:ea typeface="Cambria Math" panose="02040503050406030204" pitchFamily="18" charset="0"/>
+                          </a:rPr>
+                          <m:t>𝜓</m:t>
+                        </m:r>
+                      </m:e>
+                      <m:sub>
+                        <m:r>
+                          <a:rPr lang="en-US" i="1" smtClean="0">
+                            <a:latin typeface="Cambria Math" panose="02040503050406030204" pitchFamily="18" charset="0"/>
+                            <a:ea typeface="Cambria Math" panose="02040503050406030204" pitchFamily="18" charset="0"/>
+                          </a:rPr>
+                          <m:t>𝜆</m:t>
+                        </m:r>
+                      </m:sub>
+                    </m:sSub>
+                  </m:oMath>
+                </a14:m>
+                <a:r>
+                  <a:rPr lang="en-US" dirty="0"/>
+                  <a:t> to calculate high-energy reactions by consistently evolving the reactions part </a:t>
+                </a:r>
+                <a14:m>
+                  <m:oMath xmlns:m="http://schemas.openxmlformats.org/officeDocument/2006/math">
+                    <m:sSub>
+                      <m:sSubPr>
+                        <m:ctrlPr>
+                          <a:rPr lang="en-US" i="1" smtClean="0">
+                            <a:latin typeface="Cambria Math" panose="02040503050406030204" pitchFamily="18" charset="0"/>
+                          </a:rPr>
+                        </m:ctrlPr>
+                      </m:sSubPr>
+                      <m:e>
+                        <m:r>
+                          <a:rPr lang="en-US" b="0" i="1" smtClean="0">
+                            <a:latin typeface="Cambria Math" panose="02040503050406030204" pitchFamily="18" charset="0"/>
+                          </a:rPr>
+                          <m:t>𝑂</m:t>
+                        </m:r>
+                      </m:e>
+                      <m:sub>
+                        <m:r>
+                          <a:rPr lang="en-US" i="1" smtClean="0">
+                            <a:latin typeface="Cambria Math" panose="02040503050406030204" pitchFamily="18" charset="0"/>
+                            <a:ea typeface="Cambria Math" panose="02040503050406030204" pitchFamily="18" charset="0"/>
+                          </a:rPr>
+                          <m:t>𝜆</m:t>
+                        </m:r>
+                      </m:sub>
+                    </m:sSub>
+                  </m:oMath>
+                </a14:m>
+                <a:endParaRPr lang="en-US" dirty="0"/>
+              </a:p>
+              <a:p>
+                <a:pPr>
+                  <a:lnSpc>
+                    <a:spcPct val="100000"/>
+                  </a:lnSpc>
+                </a:pPr>
+                <a:r>
+                  <a:rPr lang="en-US" dirty="0"/>
+                  <a:t>Mismatch of scales leads to incorrect observable</a:t>
+                </a:r>
+                <a:endParaRPr lang="en-US" dirty="0">
+                  <a:latin typeface="Arial" panose="020B0604020202020204" pitchFamily="34" charset="0"/>
+                </a:endParaRPr>
+              </a:p>
+            </p:txBody>
+          </p:sp>
+        </mc:Choice>
+        <mc:Fallback>
+          <p:sp>
+            <p:nvSpPr>
+              <p:cNvPr id="3" name="Content Placeholder 2">
+                <a:extLst>
+                  <a:ext uri="{FF2B5EF4-FFF2-40B4-BE49-F238E27FC236}">
+                    <a16:creationId xmlns:a16="http://schemas.microsoft.com/office/drawing/2014/main" id="{1A8FA9B3-1B32-894B-93C2-F90FB63CBDAA}"/>
+                  </a:ext>
+                </a:extLst>
+              </p:cNvPr>
+              <p:cNvSpPr>
+                <a:spLocks noGrp="1" noRot="1" noChangeAspect="1" noMove="1" noResize="1" noEditPoints="1" noAdjustHandles="1" noChangeArrowheads="1" noChangeShapeType="1" noTextEdit="1"/>
+              </p:cNvSpPr>
+              <p:nvPr>
+                <p:ph idx="1"/>
+              </p:nvPr>
+            </p:nvSpPr>
+            <p:spPr>
+              <a:blipFill>
+                <a:blip r:embed="rId2"/>
+                <a:stretch>
+                  <a:fillRect l="-965" t="-1754" r="-121" b="-15789"/>
+                </a:stretch>
+              </a:blipFill>
+            </p:spPr>
+            <p:txBody>
+              <a:bodyPr/>
+              <a:lstStyle/>
+              <a:p>
+                <a:r>
+                  <a:rPr lang="en-US">
+                    <a:noFill/>
+                  </a:rPr>
+                  <a:t> </a:t>
+                </a:r>
+              </a:p>
+            </p:txBody>
+          </p:sp>
+        </mc:Fallback>
+      </mc:AlternateContent>
+    </p:spTree>
+    <p:extLst>
+      <p:ext uri="{BB962C8B-B14F-4D97-AF65-F5344CB8AC3E}">
+        <p14:creationId xmlns:p14="http://schemas.microsoft.com/office/powerpoint/2010/main" val="4030662358"/>
+      </p:ext>
+    </p:extLst>
+  </p:cSld>
+  <p:clrMapOvr>
+    <a:masterClrMapping/>
+  </p:clrMapOvr>
+</p:sld>
+</file>
+
+<file path=ppt/slides/slide13.xml><?xml version="1.0" encoding="utf-8"?>
+<p:sld xmlns:a="http://schemas.openxmlformats.org/drawingml/2006/main" xmlns:r="http://schemas.openxmlformats.org/officeDocument/2006/relationships" xmlns:p="http://schemas.openxmlformats.org/presentationml/2006/main">
+  <p:cSld>
+    <p:spTree>
+      <p:nvGrpSpPr>
+        <p:cNvPr id="1" name=""/>
+        <p:cNvGrpSpPr/>
+        <p:nvPr/>
+      </p:nvGrpSpPr>
+      <p:grpSpPr>
+        <a:xfrm>
+          <a:off x="0" y="0"/>
+          <a:ext cx="0" cy="0"/>
+          <a:chOff x="0" y="0"/>
+          <a:chExt cx="0" cy="0"/>
+        </a:xfrm>
+      </p:grpSpPr>
+      <p:sp>
+        <p:nvSpPr>
+          <p:cNvPr id="2" name="Title 1">
+            <a:extLst>
+              <a:ext uri="{FF2B5EF4-FFF2-40B4-BE49-F238E27FC236}">
+                <a16:creationId xmlns:a16="http://schemas.microsoft.com/office/drawing/2014/main" id="{9FECE9C7-FBB0-B54D-8E92-C3BC6CA96ED2}"/>
+              </a:ext>
+            </a:extLst>
+          </p:cNvPr>
+          <p:cNvSpPr>
+            <a:spLocks noGrp="1"/>
+          </p:cNvSpPr>
+          <p:nvPr>
+            <p:ph type="title"/>
+          </p:nvPr>
+        </p:nvSpPr>
+        <p:spPr/>
+        <p:txBody>
           <a:bodyPr>
             <a:normAutofit fontScale="90000"/>
           </a:bodyPr>
@@ -4729,7 +5557,7 @@
             </a:r>
             <a:r>
               <a:rPr lang="en-US" dirty="0"/>
-              <a:t> as an example, depending on time can provide further detail (just do band-diagonal decoupling)</a:t>
+              <a:t> as an example, depending on time can provide further detail (just do band-diagonal decoupling) (add relative momentum q)</a:t>
             </a:r>
           </a:p>
           <a:p>
@@ -4743,19 +5571,38 @@
               <a:t>Induced low-momentum contributions reflecting UV physics of the NN potential</a:t>
             </a:r>
           </a:p>
-          <a:p>
-            <a:pPr>
-              <a:lnSpc>
-                <a:spcPct val="100000"/>
-              </a:lnSpc>
-            </a:pPr>
-            <a:r>
-              <a:rPr lang="en-US" dirty="0"/>
-              <a:t>Unitary transformations, with the evolved wave function, these changes are consistent</a:t>
-            </a:r>
-          </a:p>
         </p:txBody>
       </p:sp>
+      <p:pic>
+        <p:nvPicPr>
+          <p:cNvPr id="5" name="Picture 4" descr="A picture containing screenshot, drawing&#10;&#10;Description automatically generated">
+            <a:extLst>
+              <a:ext uri="{FF2B5EF4-FFF2-40B4-BE49-F238E27FC236}">
+                <a16:creationId xmlns:a16="http://schemas.microsoft.com/office/drawing/2014/main" id="{16032205-CBB2-BF45-A39B-9E892B31F9D5}"/>
+              </a:ext>
+            </a:extLst>
+          </p:cNvPr>
+          <p:cNvPicPr>
+            <a:picLocks noChangeAspect="1"/>
+          </p:cNvPicPr>
+          <p:nvPr/>
+        </p:nvPicPr>
+        <p:blipFill>
+          <a:blip r:embed="rId2"/>
+          <a:stretch>
+            <a:fillRect/>
+          </a:stretch>
+        </p:blipFill>
+        <p:spPr>
+          <a:xfrm>
+            <a:off x="2543175" y="3814400"/>
+            <a:ext cx="6629400" cy="2845668"/>
+          </a:xfrm>
+          <a:prstGeom prst="rect">
+            <a:avLst/>
+          </a:prstGeom>
+        </p:spPr>
+      </p:pic>
     </p:spTree>
     <p:extLst>
       <p:ext uri="{BB962C8B-B14F-4D97-AF65-F5344CB8AC3E}">
@@ -4769,7 +5616,7 @@
 </p:sld>
 </file>
 
-<file path=ppt/slides/slide12.xml><?xml version="1.0" encoding="utf-8"?>
+<file path=ppt/slides/slide14.xml><?xml version="1.0" encoding="utf-8"?>
 <p:sld xmlns:a="http://schemas.openxmlformats.org/drawingml/2006/main" xmlns:r="http://schemas.openxmlformats.org/officeDocument/2006/relationships" xmlns:p="http://schemas.openxmlformats.org/presentationml/2006/main">
   <p:cSld>
     <p:spTree>
@@ -6154,342 +7001,6 @@
 </p:sld>
 </file>
 
-<file path=ppt/slides/slide13.xml><?xml version="1.0" encoding="utf-8"?>
-<p:sld xmlns:a="http://schemas.openxmlformats.org/drawingml/2006/main" xmlns:r="http://schemas.openxmlformats.org/officeDocument/2006/relationships" xmlns:p="http://schemas.openxmlformats.org/presentationml/2006/main">
-  <p:cSld>
-    <p:spTree>
-      <p:nvGrpSpPr>
-        <p:cNvPr id="1" name=""/>
-        <p:cNvGrpSpPr/>
-        <p:nvPr/>
-      </p:nvGrpSpPr>
-      <p:grpSpPr>
-        <a:xfrm>
-          <a:off x="0" y="0"/>
-          <a:ext cx="0" cy="0"/>
-          <a:chOff x="0" y="0"/>
-          <a:chExt cx="0" cy="0"/>
-        </a:xfrm>
-      </p:grpSpPr>
-      <p:sp>
-        <p:nvSpPr>
-          <p:cNvPr id="2" name="Title 1">
-            <a:extLst>
-              <a:ext uri="{FF2B5EF4-FFF2-40B4-BE49-F238E27FC236}">
-                <a16:creationId xmlns:a16="http://schemas.microsoft.com/office/drawing/2014/main" id="{9FECE9C7-FBB0-B54D-8E92-C3BC6CA96ED2}"/>
-              </a:ext>
-            </a:extLst>
-          </p:cNvPr>
-          <p:cNvSpPr>
-            <a:spLocks noGrp="1"/>
-          </p:cNvSpPr>
-          <p:nvPr>
-            <p:ph type="title"/>
-          </p:nvPr>
-        </p:nvSpPr>
-        <p:spPr/>
-        <p:txBody>
-          <a:bodyPr>
-            <a:normAutofit/>
-          </a:bodyPr>
-          <a:lstStyle/>
-          <a:p>
-            <a:pPr>
-              <a:lnSpc>
-                <a:spcPct val="100000"/>
-              </a:lnSpc>
-            </a:pPr>
-            <a:r>
-              <a:rPr lang="en-US" dirty="0">
-                <a:solidFill>
-                  <a:srgbClr val="002060"/>
-                </a:solidFill>
-                <a:latin typeface="Arial" panose="020B0604020202020204" pitchFamily="34" charset="0"/>
-              </a:rPr>
-              <a:t>Expectation value under SRG</a:t>
-            </a:r>
-          </a:p>
-        </p:txBody>
-      </p:sp>
-      <p:sp>
-        <p:nvSpPr>
-          <p:cNvPr id="3" name="Content Placeholder 2">
-            <a:extLst>
-              <a:ext uri="{FF2B5EF4-FFF2-40B4-BE49-F238E27FC236}">
-                <a16:creationId xmlns:a16="http://schemas.microsoft.com/office/drawing/2014/main" id="{1A8FA9B3-1B32-894B-93C2-F90FB63CBDAA}"/>
-              </a:ext>
-            </a:extLst>
-          </p:cNvPr>
-          <p:cNvSpPr>
-            <a:spLocks noGrp="1"/>
-          </p:cNvSpPr>
-          <p:nvPr>
-            <p:ph idx="1"/>
-          </p:nvPr>
-        </p:nvSpPr>
-        <p:spPr/>
-        <p:txBody>
-          <a:bodyPr/>
-          <a:lstStyle/>
-          <a:p>
-            <a:pPr>
-              <a:lnSpc>
-                <a:spcPct val="100000"/>
-              </a:lnSpc>
-            </a:pPr>
-            <a:r>
-              <a:rPr lang="en-US" dirty="0"/>
-              <a:t>Walk through how the &lt;\</a:t>
-            </a:r>
-            <a:r>
-              <a:rPr lang="en-US" dirty="0" err="1"/>
-              <a:t>psi_d|ataq</a:t>
-            </a:r>
-            <a:r>
-              <a:rPr lang="en-US" dirty="0"/>
-              <a:t>|\psi&gt; changes connecting back to point that we can utilize high-order chiral potentials</a:t>
-            </a:r>
-          </a:p>
-          <a:p>
-            <a:pPr>
-              <a:lnSpc>
-                <a:spcPct val="100000"/>
-              </a:lnSpc>
-            </a:pPr>
-            <a:r>
-              <a:rPr lang="en-US" dirty="0"/>
-              <a:t>Maybe do just band-diagonal decoupling</a:t>
-            </a:r>
-          </a:p>
-          <a:p>
-            <a:pPr>
-              <a:lnSpc>
-                <a:spcPct val="100000"/>
-              </a:lnSpc>
-            </a:pPr>
-            <a:endParaRPr lang="en-US" dirty="0"/>
-          </a:p>
-        </p:txBody>
-      </p:sp>
-      <p:pic>
-        <p:nvPicPr>
-          <p:cNvPr id="5" name="Picture 4" descr="A screenshot of a social media post&#10;&#10;Description automatically generated">
-            <a:extLst>
-              <a:ext uri="{FF2B5EF4-FFF2-40B4-BE49-F238E27FC236}">
-                <a16:creationId xmlns:a16="http://schemas.microsoft.com/office/drawing/2014/main" id="{E2F53986-021B-7048-9372-1237D054D061}"/>
-              </a:ext>
-            </a:extLst>
-          </p:cNvPr>
-          <p:cNvPicPr>
-            <a:picLocks noChangeAspect="1"/>
-          </p:cNvPicPr>
-          <p:nvPr/>
-        </p:nvPicPr>
-        <p:blipFill>
-          <a:blip r:embed="rId2"/>
-          <a:stretch>
-            <a:fillRect/>
-          </a:stretch>
-        </p:blipFill>
-        <p:spPr>
-          <a:xfrm>
-            <a:off x="4698124" y="3543683"/>
-            <a:ext cx="7493876" cy="3314317"/>
-          </a:xfrm>
-          <a:prstGeom prst="rect">
-            <a:avLst/>
-          </a:prstGeom>
-        </p:spPr>
-      </p:pic>
-    </p:spTree>
-    <p:extLst>
-      <p:ext uri="{BB962C8B-B14F-4D97-AF65-F5344CB8AC3E}">
-        <p14:creationId xmlns:p14="http://schemas.microsoft.com/office/powerpoint/2010/main" val="2999820937"/>
-      </p:ext>
-    </p:extLst>
-  </p:cSld>
-  <p:clrMapOvr>
-    <a:masterClrMapping/>
-  </p:clrMapOvr>
-</p:sld>
-</file>
-
-<file path=ppt/slides/slide14.xml><?xml version="1.0" encoding="utf-8"?>
-<p:sld xmlns:a="http://schemas.openxmlformats.org/drawingml/2006/main" xmlns:r="http://schemas.openxmlformats.org/officeDocument/2006/relationships" xmlns:p="http://schemas.openxmlformats.org/presentationml/2006/main">
-  <p:cSld>
-    <p:spTree>
-      <p:nvGrpSpPr>
-        <p:cNvPr id="1" name=""/>
-        <p:cNvGrpSpPr/>
-        <p:nvPr/>
-      </p:nvGrpSpPr>
-      <p:grpSpPr>
-        <a:xfrm>
-          <a:off x="0" y="0"/>
-          <a:ext cx="0" cy="0"/>
-          <a:chOff x="0" y="0"/>
-          <a:chExt cx="0" cy="0"/>
-        </a:xfrm>
-      </p:grpSpPr>
-      <p:sp>
-        <p:nvSpPr>
-          <p:cNvPr id="2" name="Title 1">
-            <a:extLst>
-              <a:ext uri="{FF2B5EF4-FFF2-40B4-BE49-F238E27FC236}">
-                <a16:creationId xmlns:a16="http://schemas.microsoft.com/office/drawing/2014/main" id="{9FECE9C7-FBB0-B54D-8E92-C3BC6CA96ED2}"/>
-              </a:ext>
-            </a:extLst>
-          </p:cNvPr>
-          <p:cNvSpPr>
-            <a:spLocks noGrp="1"/>
-          </p:cNvSpPr>
-          <p:nvPr>
-            <p:ph type="title"/>
-          </p:nvPr>
-        </p:nvSpPr>
-        <p:spPr/>
-        <p:txBody>
-          <a:bodyPr>
-            <a:normAutofit/>
-          </a:bodyPr>
-          <a:lstStyle/>
-          <a:p>
-            <a:pPr>
-              <a:lnSpc>
-                <a:spcPct val="100000"/>
-              </a:lnSpc>
-            </a:pPr>
-            <a:r>
-              <a:rPr lang="en-US" dirty="0">
-                <a:solidFill>
-                  <a:srgbClr val="002060"/>
-                </a:solidFill>
-                <a:latin typeface="Arial" panose="020B0604020202020204" pitchFamily="34" charset="0"/>
-              </a:rPr>
-              <a:t>Ratios of different potentials</a:t>
-            </a:r>
-          </a:p>
-        </p:txBody>
-      </p:sp>
-      <p:sp>
-        <p:nvSpPr>
-          <p:cNvPr id="3" name="Content Placeholder 2">
-            <a:extLst>
-              <a:ext uri="{FF2B5EF4-FFF2-40B4-BE49-F238E27FC236}">
-                <a16:creationId xmlns:a16="http://schemas.microsoft.com/office/drawing/2014/main" id="{1A8FA9B3-1B32-894B-93C2-F90FB63CBDAA}"/>
-              </a:ext>
-            </a:extLst>
-          </p:cNvPr>
-          <p:cNvSpPr>
-            <a:spLocks noGrp="1"/>
-          </p:cNvSpPr>
-          <p:nvPr>
-            <p:ph idx="1"/>
-          </p:nvPr>
-        </p:nvSpPr>
-        <p:spPr/>
-        <p:txBody>
-          <a:bodyPr/>
-          <a:lstStyle/>
-          <a:p>
-            <a:pPr>
-              <a:lnSpc>
-                <a:spcPct val="100000"/>
-              </a:lnSpc>
-            </a:pPr>
-            <a:r>
-              <a:rPr lang="en-US" dirty="0"/>
-              <a:t>Reflects difference in UV physics, maybe show </a:t>
-            </a:r>
-            <a:r>
-              <a:rPr lang="en-US" dirty="0" err="1"/>
-              <a:t>ataq</a:t>
-            </a:r>
-            <a:r>
-              <a:rPr lang="en-US" dirty="0"/>
-              <a:t>(</a:t>
-            </a:r>
-            <a:r>
-              <a:rPr lang="en-US" dirty="0" err="1"/>
-              <a:t>k,k</a:t>
-            </a:r>
-            <a:r>
-              <a:rPr lang="en-US" dirty="0"/>
-              <a:t>) ratios</a:t>
-            </a:r>
-          </a:p>
-          <a:p>
-            <a:pPr>
-              <a:lnSpc>
-                <a:spcPct val="100000"/>
-              </a:lnSpc>
-            </a:pPr>
-            <a:r>
-              <a:rPr lang="en-US" dirty="0"/>
-              <a:t>Transition into ratios of </a:t>
-            </a:r>
-            <a:r>
-              <a:rPr lang="en-US" dirty="0" err="1"/>
-              <a:t>A/d</a:t>
-            </a:r>
-            <a:r>
-              <a:rPr lang="en-US" dirty="0"/>
-              <a:t> ~ low-energy structure components</a:t>
-            </a:r>
-          </a:p>
-          <a:p>
-            <a:pPr>
-              <a:lnSpc>
-                <a:spcPct val="100000"/>
-              </a:lnSpc>
-            </a:pPr>
-            <a:endParaRPr lang="en-US" dirty="0"/>
-          </a:p>
-        </p:txBody>
-      </p:sp>
-      <p:pic>
-        <p:nvPicPr>
-          <p:cNvPr id="6" name="Picture 5">
-            <a:extLst>
-              <a:ext uri="{FF2B5EF4-FFF2-40B4-BE49-F238E27FC236}">
-                <a16:creationId xmlns:a16="http://schemas.microsoft.com/office/drawing/2014/main" id="{132229F5-1051-E24A-8883-B6E9A7780D7D}"/>
-              </a:ext>
-            </a:extLst>
-          </p:cNvPr>
-          <p:cNvPicPr>
-            <a:picLocks noChangeAspect="1"/>
-          </p:cNvPicPr>
-          <p:nvPr/>
-        </p:nvPicPr>
-        <p:blipFill>
-          <a:blip r:embed="rId2"/>
-          <a:stretch>
-            <a:fillRect/>
-          </a:stretch>
-        </p:blipFill>
-        <p:spPr>
-          <a:xfrm>
-            <a:off x="6243145" y="2949197"/>
-            <a:ext cx="5948855" cy="3908803"/>
-          </a:xfrm>
-          <a:prstGeom prst="rect">
-            <a:avLst/>
-          </a:prstGeom>
-        </p:spPr>
-      </p:pic>
-    </p:spTree>
-    <p:extLst>
-      <p:ext uri="{BB962C8B-B14F-4D97-AF65-F5344CB8AC3E}">
-        <p14:creationId xmlns:p14="http://schemas.microsoft.com/office/powerpoint/2010/main" val="2323205402"/>
-      </p:ext>
-    </p:extLst>
-  </p:cSld>
-  <p:clrMapOvr>
-    <a:masterClrMapping/>
-  </p:clrMapOvr>
-</p:sld>
-</file>
-
 <file path=ppt/slides/slide15.xml><?xml version="1.0" encoding="utf-8"?>
 <p:sld xmlns:a="http://schemas.openxmlformats.org/drawingml/2006/main" xmlns:r="http://schemas.openxmlformats.org/officeDocument/2006/relationships" xmlns:p="http://schemas.openxmlformats.org/presentationml/2006/main">
   <p:cSld>
@@ -6542,7 +7053,7 @@
                 </a:solidFill>
                 <a:latin typeface="Arial" panose="020B0604020202020204" pitchFamily="34" charset="0"/>
               </a:rPr>
-              <a:t>Summary</a:t>
+              <a:t>Expectation value under SRG</a:t>
             </a:r>
           </a:p>
         </p:txBody>
@@ -6575,7 +7086,15 @@
             </a:pPr>
             <a:r>
               <a:rPr lang="en-US" dirty="0"/>
-              <a:t>Universality in drastically different chiral potentials</a:t>
+              <a:t>Walk through the &lt;\</a:t>
+            </a:r>
+            <a:r>
+              <a:rPr lang="en-US" dirty="0" err="1"/>
+              <a:t>psi_d|ataq</a:t>
+            </a:r>
+            <a:r>
+              <a:rPr lang="en-US" dirty="0"/>
+              <a:t>|\psi&gt; changes connecting back to point that we can utilize high-order chiral potentials</a:t>
             </a:r>
           </a:p>
           <a:p>
@@ -6585,14 +7104,8 @@
               </a:lnSpc>
             </a:pPr>
             <a:r>
-              <a:rPr lang="en-US" dirty="0">
-                <a:latin typeface="Arial" panose="020B0604020202020204" pitchFamily="34" charset="0"/>
-              </a:rPr>
-              <a:t>Univer</a:t>
-            </a:r>
-            <a:r>
               <a:rPr lang="en-US" dirty="0"/>
-              <a:t>sality shows in low-energy states as well</a:t>
+              <a:t>Expectation value is shifted to low resolution</a:t>
             </a:r>
           </a:p>
           <a:p>
@@ -6603,7 +7116,7 @@
             </a:pPr>
             <a:r>
               <a:rPr lang="en-US" dirty="0"/>
-              <a:t>Uncorrelated wave functions, consistently evolved operators with SRG induced terms from UV</a:t>
+              <a:t>Maybe do just band-diagonal decoupling</a:t>
             </a:r>
           </a:p>
           <a:p>
@@ -6613,22 +7126,46 @@
               </a:lnSpc>
             </a:pPr>
             <a:r>
-              <a:rPr lang="en-US" dirty="0">
-                <a:latin typeface="Arial" panose="020B0604020202020204" pitchFamily="34" charset="0"/>
-              </a:rPr>
-              <a:t>Essentially decoupl</a:t>
-            </a:r>
-            <a:r>
               <a:rPr lang="en-US" dirty="0"/>
-              <a:t>es calculation from high-energy for low-energy states</a:t>
+              <a:t>Arrows to indicate scale dependence (left to right) and scheme dependence (up to down)</a:t>
             </a:r>
           </a:p>
         </p:txBody>
       </p:sp>
+      <p:pic>
+        <p:nvPicPr>
+          <p:cNvPr id="5" name="Picture 4" descr="A screenshot of a social media post&#10;&#10;Description automatically generated">
+            <a:extLst>
+              <a:ext uri="{FF2B5EF4-FFF2-40B4-BE49-F238E27FC236}">
+                <a16:creationId xmlns:a16="http://schemas.microsoft.com/office/drawing/2014/main" id="{E2F53986-021B-7048-9372-1237D054D061}"/>
+              </a:ext>
+            </a:extLst>
+          </p:cNvPr>
+          <p:cNvPicPr>
+            <a:picLocks noChangeAspect="1"/>
+          </p:cNvPicPr>
+          <p:nvPr/>
+        </p:nvPicPr>
+        <p:blipFill>
+          <a:blip r:embed="rId2"/>
+          <a:stretch>
+            <a:fillRect/>
+          </a:stretch>
+        </p:blipFill>
+        <p:spPr>
+          <a:xfrm>
+            <a:off x="6358758" y="4278132"/>
+            <a:ext cx="5833241" cy="2579868"/>
+          </a:xfrm>
+          <a:prstGeom prst="rect">
+            <a:avLst/>
+          </a:prstGeom>
+        </p:spPr>
+      </p:pic>
     </p:spTree>
     <p:extLst>
       <p:ext uri="{BB962C8B-B14F-4D97-AF65-F5344CB8AC3E}">
-        <p14:creationId xmlns:p14="http://schemas.microsoft.com/office/powerpoint/2010/main" val="3739908508"/>
+        <p14:creationId xmlns:p14="http://schemas.microsoft.com/office/powerpoint/2010/main" val="2999820937"/>
       </p:ext>
     </p:extLst>
   </p:cSld>
@@ -6690,7 +7227,7 @@
                 </a:solidFill>
                 <a:latin typeface="Arial" panose="020B0604020202020204" pitchFamily="34" charset="0"/>
               </a:rPr>
-              <a:t>Outlook</a:t>
+              <a:t>Ratios of different potentials</a:t>
             </a:r>
           </a:p>
         </p:txBody>
@@ -6723,7 +7260,23 @@
             </a:pPr>
             <a:r>
               <a:rPr lang="en-US" dirty="0"/>
-              <a:t>Universality in drastically different chiral potentials</a:t>
+              <a:t>SRG induced terms in the operator reflects difference in UV physics, maybe show </a:t>
+            </a:r>
+            <a:r>
+              <a:rPr lang="en-US" dirty="0" err="1"/>
+              <a:t>ataq</a:t>
+            </a:r>
+            <a:r>
+              <a:rPr lang="en-US" dirty="0"/>
+              <a:t>(</a:t>
+            </a:r>
+            <a:r>
+              <a:rPr lang="en-US" dirty="0" err="1"/>
+              <a:t>k,k</a:t>
+            </a:r>
+            <a:r>
+              <a:rPr lang="en-US" dirty="0"/>
+              <a:t>) ratios</a:t>
             </a:r>
           </a:p>
           <a:p>
@@ -6734,29 +7287,15 @@
             </a:pPr>
             <a:r>
               <a:rPr lang="en-US" dirty="0"/>
-              <a:t>Universality shows in low-energy states as well</a:t>
-            </a:r>
-          </a:p>
-          <a:p>
-            <a:pPr>
-              <a:lnSpc>
-                <a:spcPct val="100000"/>
-              </a:lnSpc>
-            </a:pPr>
+              <a:t>Transition into ratios of </a:t>
+            </a:r>
+            <a:r>
+              <a:rPr lang="en-US" dirty="0" err="1"/>
+              <a:t>A/d</a:t>
+            </a:r>
             <a:r>
               <a:rPr lang="en-US" dirty="0"/>
-              <a:t>Uncorrelated wave functions, consistently evolved operators with SRG induced terms from UV</a:t>
-            </a:r>
-          </a:p>
-          <a:p>
-            <a:pPr>
-              <a:lnSpc>
-                <a:spcPct val="100000"/>
-              </a:lnSpc>
-            </a:pPr>
-            <a:r>
-              <a:rPr lang="en-US" dirty="0"/>
-              <a:t>Essentially decouples calculation from high-energy for low-energy states</a:t>
+              <a:t> ~ low-energy structure components</a:t>
             </a:r>
           </a:p>
           <a:p>
@@ -6769,10 +7308,544 @@
           </a:p>
         </p:txBody>
       </p:sp>
+      <p:pic>
+        <p:nvPicPr>
+          <p:cNvPr id="6" name="Picture 5">
+            <a:extLst>
+              <a:ext uri="{FF2B5EF4-FFF2-40B4-BE49-F238E27FC236}">
+                <a16:creationId xmlns:a16="http://schemas.microsoft.com/office/drawing/2014/main" id="{132229F5-1051-E24A-8883-B6E9A7780D7D}"/>
+              </a:ext>
+            </a:extLst>
+          </p:cNvPr>
+          <p:cNvPicPr>
+            <a:picLocks noChangeAspect="1"/>
+          </p:cNvPicPr>
+          <p:nvPr/>
+        </p:nvPicPr>
+        <p:blipFill>
+          <a:blip r:embed="rId2"/>
+          <a:stretch>
+            <a:fillRect/>
+          </a:stretch>
+        </p:blipFill>
+        <p:spPr>
+          <a:xfrm>
+            <a:off x="3184635" y="3453336"/>
+            <a:ext cx="5181600" cy="3404664"/>
+          </a:xfrm>
+          <a:prstGeom prst="rect">
+            <a:avLst/>
+          </a:prstGeom>
+        </p:spPr>
+      </p:pic>
     </p:spTree>
     <p:extLst>
       <p:ext uri="{BB962C8B-B14F-4D97-AF65-F5344CB8AC3E}">
-        <p14:creationId xmlns:p14="http://schemas.microsoft.com/office/powerpoint/2010/main" val="1363396783"/>
+        <p14:creationId xmlns:p14="http://schemas.microsoft.com/office/powerpoint/2010/main" val="2323205402"/>
+      </p:ext>
+    </p:extLst>
+  </p:cSld>
+  <p:clrMapOvr>
+    <a:masterClrMapping/>
+  </p:clrMapOvr>
+</p:sld>
+</file>
+
+<file path=ppt/slides/slide17.xml><?xml version="1.0" encoding="utf-8"?>
+<p:sld xmlns:a="http://schemas.openxmlformats.org/drawingml/2006/main" xmlns:r="http://schemas.openxmlformats.org/officeDocument/2006/relationships" xmlns:p="http://schemas.openxmlformats.org/presentationml/2006/main">
+  <p:cSld>
+    <p:spTree>
+      <p:nvGrpSpPr>
+        <p:cNvPr id="1" name=""/>
+        <p:cNvGrpSpPr/>
+        <p:nvPr/>
+      </p:nvGrpSpPr>
+      <p:grpSpPr>
+        <a:xfrm>
+          <a:off x="0" y="0"/>
+          <a:ext cx="0" cy="0"/>
+          <a:chOff x="0" y="0"/>
+          <a:chExt cx="0" cy="0"/>
+        </a:xfrm>
+      </p:grpSpPr>
+      <p:sp>
+        <p:nvSpPr>
+          <p:cNvPr id="2" name="Title 1">
+            <a:extLst>
+              <a:ext uri="{FF2B5EF4-FFF2-40B4-BE49-F238E27FC236}">
+                <a16:creationId xmlns:a16="http://schemas.microsoft.com/office/drawing/2014/main" id="{9FECE9C7-FBB0-B54D-8E92-C3BC6CA96ED2}"/>
+              </a:ext>
+            </a:extLst>
+          </p:cNvPr>
+          <p:cNvSpPr>
+            <a:spLocks noGrp="1"/>
+          </p:cNvSpPr>
+          <p:nvPr>
+            <p:ph type="title"/>
+          </p:nvPr>
+        </p:nvSpPr>
+        <p:spPr/>
+        <p:txBody>
+          <a:bodyPr>
+            <a:normAutofit/>
+          </a:bodyPr>
+          <a:lstStyle/>
+          <a:p>
+            <a:pPr>
+              <a:lnSpc>
+                <a:spcPct val="100000"/>
+              </a:lnSpc>
+            </a:pPr>
+            <a:r>
+              <a:rPr lang="en-US" dirty="0">
+                <a:solidFill>
+                  <a:srgbClr val="002060"/>
+                </a:solidFill>
+                <a:latin typeface="Arial" panose="020B0604020202020204" pitchFamily="34" charset="0"/>
+              </a:rPr>
+              <a:t>Ratios of different potentials</a:t>
+            </a:r>
+          </a:p>
+        </p:txBody>
+      </p:sp>
+      <p:sp>
+        <p:nvSpPr>
+          <p:cNvPr id="3" name="Content Placeholder 2">
+            <a:extLst>
+              <a:ext uri="{FF2B5EF4-FFF2-40B4-BE49-F238E27FC236}">
+                <a16:creationId xmlns:a16="http://schemas.microsoft.com/office/drawing/2014/main" id="{1A8FA9B3-1B32-894B-93C2-F90FB63CBDAA}"/>
+              </a:ext>
+            </a:extLst>
+          </p:cNvPr>
+          <p:cNvSpPr>
+            <a:spLocks noGrp="1"/>
+          </p:cNvSpPr>
+          <p:nvPr>
+            <p:ph idx="1"/>
+          </p:nvPr>
+        </p:nvSpPr>
+        <p:spPr/>
+        <p:txBody>
+          <a:bodyPr/>
+          <a:lstStyle/>
+          <a:p>
+            <a:pPr>
+              <a:lnSpc>
+                <a:spcPct val="100000"/>
+              </a:lnSpc>
+            </a:pPr>
+            <a:r>
+              <a:rPr lang="en-US" dirty="0"/>
+              <a:t>SRG induced terms in the operator reflects difference in UV physics, maybe show </a:t>
+            </a:r>
+            <a:r>
+              <a:rPr lang="en-US" dirty="0" err="1"/>
+              <a:t>ataq</a:t>
+            </a:r>
+            <a:r>
+              <a:rPr lang="en-US" dirty="0"/>
+              <a:t>(</a:t>
+            </a:r>
+            <a:r>
+              <a:rPr lang="en-US" dirty="0" err="1"/>
+              <a:t>k,k</a:t>
+            </a:r>
+            <a:r>
+              <a:rPr lang="en-US" dirty="0"/>
+              <a:t>) ratios</a:t>
+            </a:r>
+          </a:p>
+          <a:p>
+            <a:pPr>
+              <a:lnSpc>
+                <a:spcPct val="100000"/>
+              </a:lnSpc>
+            </a:pPr>
+            <a:r>
+              <a:rPr lang="en-US" dirty="0"/>
+              <a:t>Transition into ratios of </a:t>
+            </a:r>
+            <a:r>
+              <a:rPr lang="en-US" dirty="0" err="1"/>
+              <a:t>A/d</a:t>
+            </a:r>
+            <a:r>
+              <a:rPr lang="en-US" dirty="0"/>
+              <a:t> ~ low-energy structure components</a:t>
+            </a:r>
+          </a:p>
+          <a:p>
+            <a:pPr>
+              <a:lnSpc>
+                <a:spcPct val="100000"/>
+              </a:lnSpc>
+            </a:pPr>
+            <a:endParaRPr lang="en-US" dirty="0"/>
+          </a:p>
+        </p:txBody>
+      </p:sp>
+      <p:pic>
+        <p:nvPicPr>
+          <p:cNvPr id="6" name="Picture 5">
+            <a:extLst>
+              <a:ext uri="{FF2B5EF4-FFF2-40B4-BE49-F238E27FC236}">
+                <a16:creationId xmlns:a16="http://schemas.microsoft.com/office/drawing/2014/main" id="{132229F5-1051-E24A-8883-B6E9A7780D7D}"/>
+              </a:ext>
+            </a:extLst>
+          </p:cNvPr>
+          <p:cNvPicPr>
+            <a:picLocks noChangeAspect="1"/>
+          </p:cNvPicPr>
+          <p:nvPr/>
+        </p:nvPicPr>
+        <p:blipFill>
+          <a:blip r:embed="rId2"/>
+          <a:stretch>
+            <a:fillRect/>
+          </a:stretch>
+        </p:blipFill>
+        <p:spPr>
+          <a:xfrm>
+            <a:off x="3184635" y="3453336"/>
+            <a:ext cx="5181600" cy="3404664"/>
+          </a:xfrm>
+          <a:prstGeom prst="rect">
+            <a:avLst/>
+          </a:prstGeom>
+        </p:spPr>
+      </p:pic>
+    </p:spTree>
+    <p:extLst>
+      <p:ext uri="{BB962C8B-B14F-4D97-AF65-F5344CB8AC3E}">
+        <p14:creationId xmlns:p14="http://schemas.microsoft.com/office/powerpoint/2010/main" val="2024028779"/>
+      </p:ext>
+    </p:extLst>
+  </p:cSld>
+  <p:clrMapOvr>
+    <a:masterClrMapping/>
+  </p:clrMapOvr>
+</p:sld>
+</file>
+
+<file path=ppt/slides/slide18.xml><?xml version="1.0" encoding="utf-8"?>
+<p:sld xmlns:a="http://schemas.openxmlformats.org/drawingml/2006/main" xmlns:r="http://schemas.openxmlformats.org/officeDocument/2006/relationships" xmlns:p="http://schemas.openxmlformats.org/presentationml/2006/main">
+  <p:cSld>
+    <p:spTree>
+      <p:nvGrpSpPr>
+        <p:cNvPr id="1" name=""/>
+        <p:cNvGrpSpPr/>
+        <p:nvPr/>
+      </p:nvGrpSpPr>
+      <p:grpSpPr>
+        <a:xfrm>
+          <a:off x="0" y="0"/>
+          <a:ext cx="0" cy="0"/>
+          <a:chOff x="0" y="0"/>
+          <a:chExt cx="0" cy="0"/>
+        </a:xfrm>
+      </p:grpSpPr>
+      <p:sp>
+        <p:nvSpPr>
+          <p:cNvPr id="2" name="Title 1">
+            <a:extLst>
+              <a:ext uri="{FF2B5EF4-FFF2-40B4-BE49-F238E27FC236}">
+                <a16:creationId xmlns:a16="http://schemas.microsoft.com/office/drawing/2014/main" id="{9FECE9C7-FBB0-B54D-8E92-C3BC6CA96ED2}"/>
+              </a:ext>
+            </a:extLst>
+          </p:cNvPr>
+          <p:cNvSpPr>
+            <a:spLocks noGrp="1"/>
+          </p:cNvSpPr>
+          <p:nvPr>
+            <p:ph type="title"/>
+          </p:nvPr>
+        </p:nvSpPr>
+        <p:spPr/>
+        <p:txBody>
+          <a:bodyPr>
+            <a:normAutofit/>
+          </a:bodyPr>
+          <a:lstStyle/>
+          <a:p>
+            <a:pPr>
+              <a:lnSpc>
+                <a:spcPct val="100000"/>
+              </a:lnSpc>
+            </a:pPr>
+            <a:r>
+              <a:rPr lang="en-US" dirty="0">
+                <a:solidFill>
+                  <a:srgbClr val="002060"/>
+                </a:solidFill>
+                <a:latin typeface="Arial" panose="020B0604020202020204" pitchFamily="34" charset="0"/>
+              </a:rPr>
+              <a:t>Ratios of different potentials</a:t>
+            </a:r>
+          </a:p>
+        </p:txBody>
+      </p:sp>
+      <p:sp>
+        <p:nvSpPr>
+          <p:cNvPr id="3" name="Content Placeholder 2">
+            <a:extLst>
+              <a:ext uri="{FF2B5EF4-FFF2-40B4-BE49-F238E27FC236}">
+                <a16:creationId xmlns:a16="http://schemas.microsoft.com/office/drawing/2014/main" id="{1A8FA9B3-1B32-894B-93C2-F90FB63CBDAA}"/>
+              </a:ext>
+            </a:extLst>
+          </p:cNvPr>
+          <p:cNvSpPr>
+            <a:spLocks noGrp="1"/>
+          </p:cNvSpPr>
+          <p:nvPr>
+            <p:ph idx="1"/>
+          </p:nvPr>
+        </p:nvSpPr>
+        <p:spPr/>
+        <p:txBody>
+          <a:bodyPr/>
+          <a:lstStyle/>
+          <a:p>
+            <a:pPr>
+              <a:lnSpc>
+                <a:spcPct val="100000"/>
+              </a:lnSpc>
+            </a:pPr>
+            <a:r>
+              <a:rPr lang="en-US" dirty="0"/>
+              <a:t>SRG induced terms in the operator reflects difference in UV physics, maybe show </a:t>
+            </a:r>
+            <a:r>
+              <a:rPr lang="en-US" dirty="0" err="1"/>
+              <a:t>ataq</a:t>
+            </a:r>
+            <a:r>
+              <a:rPr lang="en-US" dirty="0"/>
+              <a:t>(</a:t>
+            </a:r>
+            <a:r>
+              <a:rPr lang="en-US" dirty="0" err="1"/>
+              <a:t>k,k</a:t>
+            </a:r>
+            <a:r>
+              <a:rPr lang="en-US" dirty="0"/>
+              <a:t>) ratios</a:t>
+            </a:r>
+          </a:p>
+          <a:p>
+            <a:pPr>
+              <a:lnSpc>
+                <a:spcPct val="100000"/>
+              </a:lnSpc>
+            </a:pPr>
+            <a:r>
+              <a:rPr lang="en-US" dirty="0"/>
+              <a:t>Transition into ratios of </a:t>
+            </a:r>
+            <a:r>
+              <a:rPr lang="en-US" dirty="0" err="1"/>
+              <a:t>A/d</a:t>
+            </a:r>
+            <a:r>
+              <a:rPr lang="en-US" dirty="0"/>
+              <a:t> ~ low-energy structure components</a:t>
+            </a:r>
+          </a:p>
+          <a:p>
+            <a:pPr>
+              <a:lnSpc>
+                <a:spcPct val="100000"/>
+              </a:lnSpc>
+            </a:pPr>
+            <a:r>
+              <a:rPr lang="en-US" dirty="0"/>
+              <a:t>Add in momentum distributions</a:t>
+            </a:r>
+          </a:p>
+        </p:txBody>
+      </p:sp>
+      <p:pic>
+        <p:nvPicPr>
+          <p:cNvPr id="6" name="Picture 5">
+            <a:extLst>
+              <a:ext uri="{FF2B5EF4-FFF2-40B4-BE49-F238E27FC236}">
+                <a16:creationId xmlns:a16="http://schemas.microsoft.com/office/drawing/2014/main" id="{132229F5-1051-E24A-8883-B6E9A7780D7D}"/>
+              </a:ext>
+            </a:extLst>
+          </p:cNvPr>
+          <p:cNvPicPr>
+            <a:picLocks noChangeAspect="1"/>
+          </p:cNvPicPr>
+          <p:nvPr/>
+        </p:nvPicPr>
+        <p:blipFill>
+          <a:blip r:embed="rId2"/>
+          <a:stretch>
+            <a:fillRect/>
+          </a:stretch>
+        </p:blipFill>
+        <p:spPr>
+          <a:xfrm>
+            <a:off x="6894787" y="3453336"/>
+            <a:ext cx="5181600" cy="3404664"/>
+          </a:xfrm>
+          <a:prstGeom prst="rect">
+            <a:avLst/>
+          </a:prstGeom>
+        </p:spPr>
+      </p:pic>
+    </p:spTree>
+    <p:extLst>
+      <p:ext uri="{BB962C8B-B14F-4D97-AF65-F5344CB8AC3E}">
+        <p14:creationId xmlns:p14="http://schemas.microsoft.com/office/powerpoint/2010/main" val="1994531800"/>
+      </p:ext>
+    </p:extLst>
+  </p:cSld>
+  <p:clrMapOvr>
+    <a:masterClrMapping/>
+  </p:clrMapOvr>
+</p:sld>
+</file>
+
+<file path=ppt/slides/slide19.xml><?xml version="1.0" encoding="utf-8"?>
+<p:sld xmlns:a="http://schemas.openxmlformats.org/drawingml/2006/main" xmlns:r="http://schemas.openxmlformats.org/officeDocument/2006/relationships" xmlns:p="http://schemas.openxmlformats.org/presentationml/2006/main">
+  <p:cSld>
+    <p:spTree>
+      <p:nvGrpSpPr>
+        <p:cNvPr id="1" name=""/>
+        <p:cNvGrpSpPr/>
+        <p:nvPr/>
+      </p:nvGrpSpPr>
+      <p:grpSpPr>
+        <a:xfrm>
+          <a:off x="0" y="0"/>
+          <a:ext cx="0" cy="0"/>
+          <a:chOff x="0" y="0"/>
+          <a:chExt cx="0" cy="0"/>
+        </a:xfrm>
+      </p:grpSpPr>
+      <p:sp>
+        <p:nvSpPr>
+          <p:cNvPr id="2" name="Title 1">
+            <a:extLst>
+              <a:ext uri="{FF2B5EF4-FFF2-40B4-BE49-F238E27FC236}">
+                <a16:creationId xmlns:a16="http://schemas.microsoft.com/office/drawing/2014/main" id="{9FECE9C7-FBB0-B54D-8E92-C3BC6CA96ED2}"/>
+              </a:ext>
+            </a:extLst>
+          </p:cNvPr>
+          <p:cNvSpPr>
+            <a:spLocks noGrp="1"/>
+          </p:cNvSpPr>
+          <p:nvPr>
+            <p:ph type="title"/>
+          </p:nvPr>
+        </p:nvSpPr>
+        <p:spPr/>
+        <p:txBody>
+          <a:bodyPr>
+            <a:normAutofit/>
+          </a:bodyPr>
+          <a:lstStyle/>
+          <a:p>
+            <a:pPr>
+              <a:lnSpc>
+                <a:spcPct val="100000"/>
+              </a:lnSpc>
+            </a:pPr>
+            <a:r>
+              <a:rPr lang="en-US" dirty="0">
+                <a:solidFill>
+                  <a:srgbClr val="002060"/>
+                </a:solidFill>
+                <a:latin typeface="Arial" panose="020B0604020202020204" pitchFamily="34" charset="0"/>
+              </a:rPr>
+              <a:t>Summary</a:t>
+            </a:r>
+          </a:p>
+        </p:txBody>
+      </p:sp>
+      <p:sp>
+        <p:nvSpPr>
+          <p:cNvPr id="3" name="Content Placeholder 2">
+            <a:extLst>
+              <a:ext uri="{FF2B5EF4-FFF2-40B4-BE49-F238E27FC236}">
+                <a16:creationId xmlns:a16="http://schemas.microsoft.com/office/drawing/2014/main" id="{1A8FA9B3-1B32-894B-93C2-F90FB63CBDAA}"/>
+              </a:ext>
+            </a:extLst>
+          </p:cNvPr>
+          <p:cNvSpPr>
+            <a:spLocks noGrp="1"/>
+          </p:cNvSpPr>
+          <p:nvPr>
+            <p:ph idx="1"/>
+          </p:nvPr>
+        </p:nvSpPr>
+        <p:spPr/>
+        <p:txBody>
+          <a:bodyPr/>
+          <a:lstStyle/>
+          <a:p>
+            <a:pPr>
+              <a:lnSpc>
+                <a:spcPct val="100000"/>
+              </a:lnSpc>
+            </a:pPr>
+            <a:r>
+              <a:rPr lang="en-US" dirty="0"/>
+              <a:t>Universality in drastically different chiral potentials</a:t>
+            </a:r>
+          </a:p>
+          <a:p>
+            <a:pPr>
+              <a:lnSpc>
+                <a:spcPct val="100000"/>
+              </a:lnSpc>
+            </a:pPr>
+            <a:r>
+              <a:rPr lang="en-US" dirty="0">
+                <a:latin typeface="Arial" panose="020B0604020202020204" pitchFamily="34" charset="0"/>
+              </a:rPr>
+              <a:t>Univer</a:t>
+            </a:r>
+            <a:r>
+              <a:rPr lang="en-US" dirty="0"/>
+              <a:t>sality shows in low-energy states as well</a:t>
+            </a:r>
+          </a:p>
+          <a:p>
+            <a:pPr>
+              <a:lnSpc>
+                <a:spcPct val="100000"/>
+              </a:lnSpc>
+            </a:pPr>
+            <a:r>
+              <a:rPr lang="en-US" dirty="0"/>
+              <a:t>Soft wave functions, consistently evolved operators with SRG induced terms from UV: </a:t>
+            </a:r>
+            <a:r>
+              <a:rPr lang="en-US" dirty="0">
+                <a:latin typeface="Arial" panose="020B0604020202020204" pitchFamily="34" charset="0"/>
+              </a:rPr>
+              <a:t>decoupl</a:t>
+            </a:r>
+            <a:r>
+              <a:rPr lang="en-US" dirty="0"/>
+              <a:t>es calculation from high-energy for low-energy states</a:t>
+            </a:r>
+          </a:p>
+          <a:p>
+            <a:pPr>
+              <a:lnSpc>
+                <a:spcPct val="100000"/>
+              </a:lnSpc>
+            </a:pPr>
+            <a:endParaRPr lang="en-US" dirty="0"/>
+          </a:p>
+        </p:txBody>
+      </p:sp>
+    </p:spTree>
+    <p:extLst>
+      <p:ext uri="{BB962C8B-B14F-4D97-AF65-F5344CB8AC3E}">
+        <p14:creationId xmlns:p14="http://schemas.microsoft.com/office/powerpoint/2010/main" val="3739908508"/>
       </p:ext>
     </p:extLst>
   </p:cSld>
@@ -6886,7 +7959,7 @@
                 </a:r>
                 <a:r>
                   <a:rPr lang="en-US" dirty="0"/>
-                  <a:t>) in the last few years</a:t>
+                  <a:t>) in the last few years (emphasize scheme dependence here)</a:t>
                 </a:r>
               </a:p>
               <a:p>
@@ -6931,7 +8004,22 @@
                       <a:srgbClr val="C00000"/>
                     </a:solidFill>
                   </a:rPr>
-                  <a:t>Revisit the question of how different potentials (regulator functions, cutoff, order, etc.) change under SRG transformations and how these transformations affect other operators</a:t>
+                  <a:t>Universality: at low resolution, different NN interactions are the same. Revisit this with new chiral interactions.</a:t>
+                </a:r>
+              </a:p>
+              <a:p>
+                <a:pPr>
+                  <a:lnSpc>
+                    <a:spcPct val="100000"/>
+                  </a:lnSpc>
+                </a:pPr>
+                <a:r>
+                  <a:rPr lang="en-US" dirty="0">
+                    <a:solidFill>
+                      <a:srgbClr val="C00000"/>
+                    </a:solidFill>
+                  </a:rPr>
+                  <a:t>Use SRG to analyze high-energy reactions at low resolution by consistently evolving wave function and corresponding operators</a:t>
                 </a:r>
               </a:p>
             </p:txBody>
@@ -6958,7 +8046,7 @@
               <a:blipFill>
                 <a:blip r:embed="rId2"/>
                 <a:stretch>
-                  <a:fillRect l="-965" t="-1754" r="-1930"/>
+                  <a:fillRect l="-965" t="-1754" r="-121" b="-12865"/>
                 </a:stretch>
               </a:blipFill>
             </p:spPr>
@@ -6981,6 +8069,192 @@
     <p:extLst>
       <p:ext uri="{BB962C8B-B14F-4D97-AF65-F5344CB8AC3E}">
         <p14:creationId xmlns:p14="http://schemas.microsoft.com/office/powerpoint/2010/main" val="1802450839"/>
+      </p:ext>
+    </p:extLst>
+  </p:cSld>
+  <p:clrMapOvr>
+    <a:masterClrMapping/>
+  </p:clrMapOvr>
+</p:sld>
+</file>
+
+<file path=ppt/slides/slide20.xml><?xml version="1.0" encoding="utf-8"?>
+<p:sld xmlns:a="http://schemas.openxmlformats.org/drawingml/2006/main" xmlns:r="http://schemas.openxmlformats.org/officeDocument/2006/relationships" xmlns:p="http://schemas.openxmlformats.org/presentationml/2006/main">
+  <p:cSld>
+    <p:spTree>
+      <p:nvGrpSpPr>
+        <p:cNvPr id="1" name=""/>
+        <p:cNvGrpSpPr/>
+        <p:nvPr/>
+      </p:nvGrpSpPr>
+      <p:grpSpPr>
+        <a:xfrm>
+          <a:off x="0" y="0"/>
+          <a:ext cx="0" cy="0"/>
+          <a:chOff x="0" y="0"/>
+          <a:chExt cx="0" cy="0"/>
+        </a:xfrm>
+      </p:grpSpPr>
+      <p:sp>
+        <p:nvSpPr>
+          <p:cNvPr id="2" name="Title 1">
+            <a:extLst>
+              <a:ext uri="{FF2B5EF4-FFF2-40B4-BE49-F238E27FC236}">
+                <a16:creationId xmlns:a16="http://schemas.microsoft.com/office/drawing/2014/main" id="{9FECE9C7-FBB0-B54D-8E92-C3BC6CA96ED2}"/>
+              </a:ext>
+            </a:extLst>
+          </p:cNvPr>
+          <p:cNvSpPr>
+            <a:spLocks noGrp="1"/>
+          </p:cNvSpPr>
+          <p:nvPr>
+            <p:ph type="title"/>
+          </p:nvPr>
+        </p:nvSpPr>
+        <p:spPr/>
+        <p:txBody>
+          <a:bodyPr>
+            <a:normAutofit/>
+          </a:bodyPr>
+          <a:lstStyle/>
+          <a:p>
+            <a:pPr>
+              <a:lnSpc>
+                <a:spcPct val="100000"/>
+              </a:lnSpc>
+            </a:pPr>
+            <a:r>
+              <a:rPr lang="en-US" dirty="0">
+                <a:solidFill>
+                  <a:srgbClr val="002060"/>
+                </a:solidFill>
+                <a:latin typeface="Arial" panose="020B0604020202020204" pitchFamily="34" charset="0"/>
+              </a:rPr>
+              <a:t>Outlook</a:t>
+            </a:r>
+          </a:p>
+        </p:txBody>
+      </p:sp>
+      <p:sp>
+        <p:nvSpPr>
+          <p:cNvPr id="3" name="Content Placeholder 2">
+            <a:extLst>
+              <a:ext uri="{FF2B5EF4-FFF2-40B4-BE49-F238E27FC236}">
+                <a16:creationId xmlns:a16="http://schemas.microsoft.com/office/drawing/2014/main" id="{1A8FA9B3-1B32-894B-93C2-F90FB63CBDAA}"/>
+              </a:ext>
+            </a:extLst>
+          </p:cNvPr>
+          <p:cNvSpPr>
+            <a:spLocks noGrp="1"/>
+          </p:cNvSpPr>
+          <p:nvPr>
+            <p:ph idx="1"/>
+          </p:nvPr>
+        </p:nvSpPr>
+        <p:spPr/>
+        <p:txBody>
+          <a:bodyPr/>
+          <a:lstStyle/>
+          <a:p>
+            <a:pPr>
+              <a:lnSpc>
+                <a:spcPct val="100000"/>
+              </a:lnSpc>
+            </a:pPr>
+            <a:endParaRPr lang="en-US" dirty="0"/>
+          </a:p>
+        </p:txBody>
+      </p:sp>
+    </p:spTree>
+    <p:extLst>
+      <p:ext uri="{BB962C8B-B14F-4D97-AF65-F5344CB8AC3E}">
+        <p14:creationId xmlns:p14="http://schemas.microsoft.com/office/powerpoint/2010/main" val="1363396783"/>
+      </p:ext>
+    </p:extLst>
+  </p:cSld>
+  <p:clrMapOvr>
+    <a:masterClrMapping/>
+  </p:clrMapOvr>
+</p:sld>
+</file>
+
+<file path=ppt/slides/slide21.xml><?xml version="1.0" encoding="utf-8"?>
+<p:sld xmlns:a="http://schemas.openxmlformats.org/drawingml/2006/main" xmlns:r="http://schemas.openxmlformats.org/officeDocument/2006/relationships" xmlns:p="http://schemas.openxmlformats.org/presentationml/2006/main">
+  <p:cSld>
+    <p:spTree>
+      <p:nvGrpSpPr>
+        <p:cNvPr id="1" name=""/>
+        <p:cNvGrpSpPr/>
+        <p:nvPr/>
+      </p:nvGrpSpPr>
+      <p:grpSpPr>
+        <a:xfrm>
+          <a:off x="0" y="0"/>
+          <a:ext cx="0" cy="0"/>
+          <a:chOff x="0" y="0"/>
+          <a:chExt cx="0" cy="0"/>
+        </a:xfrm>
+      </p:grpSpPr>
+      <p:sp>
+        <p:nvSpPr>
+          <p:cNvPr id="2" name="Title 1">
+            <a:extLst>
+              <a:ext uri="{FF2B5EF4-FFF2-40B4-BE49-F238E27FC236}">
+                <a16:creationId xmlns:a16="http://schemas.microsoft.com/office/drawing/2014/main" id="{0E1B6706-54E2-8948-AC16-32BCCF68AE95}"/>
+              </a:ext>
+            </a:extLst>
+          </p:cNvPr>
+          <p:cNvSpPr>
+            <a:spLocks noGrp="1"/>
+          </p:cNvSpPr>
+          <p:nvPr>
+            <p:ph type="title"/>
+          </p:nvPr>
+        </p:nvSpPr>
+        <p:spPr/>
+        <p:txBody>
+          <a:bodyPr/>
+          <a:lstStyle/>
+          <a:p>
+            <a:r>
+              <a:rPr lang="en-US" dirty="0"/>
+              <a:t>Back up slides</a:t>
+            </a:r>
+          </a:p>
+        </p:txBody>
+      </p:sp>
+      <p:sp>
+        <p:nvSpPr>
+          <p:cNvPr id="3" name="Content Placeholder 2">
+            <a:extLst>
+              <a:ext uri="{FF2B5EF4-FFF2-40B4-BE49-F238E27FC236}">
+                <a16:creationId xmlns:a16="http://schemas.microsoft.com/office/drawing/2014/main" id="{ABD6E5A7-0CC1-9542-84AB-62DE2ABB1E70}"/>
+              </a:ext>
+            </a:extLst>
+          </p:cNvPr>
+          <p:cNvSpPr>
+            <a:spLocks noGrp="1"/>
+          </p:cNvSpPr>
+          <p:nvPr>
+            <p:ph idx="1"/>
+          </p:nvPr>
+        </p:nvSpPr>
+        <p:spPr/>
+        <p:txBody>
+          <a:bodyPr/>
+          <a:lstStyle/>
+          <a:p>
+            <a:r>
+              <a:rPr lang="en-US" dirty="0"/>
+              <a:t>Add high cutoffs psi(r) figure</a:t>
+            </a:r>
+          </a:p>
+        </p:txBody>
+      </p:sp>
+    </p:spTree>
+    <p:extLst>
+      <p:ext uri="{BB962C8B-B14F-4D97-AF65-F5344CB8AC3E}">
+        <p14:creationId xmlns:p14="http://schemas.microsoft.com/office/powerpoint/2010/main" val="627312157"/>
       </p:ext>
     </p:extLst>
   </p:cSld>
@@ -7879,6 +9153,17 @@
               <a:t>Explanation of universality: phase equivalence</a:t>
             </a:r>
           </a:p>
+          <a:p>
+            <a:pPr>
+              <a:lnSpc>
+                <a:spcPct val="100000"/>
+              </a:lnSpc>
+            </a:pPr>
+            <a:r>
+              <a:rPr lang="en-US" sz="2400" dirty="0"/>
+              <a:t>Emphasize where we have scheme dependence</a:t>
+            </a:r>
+          </a:p>
         </p:txBody>
       </p:sp>
       <p:pic>
@@ -8515,7 +9800,12 @@
             <p:ph idx="1"/>
           </p:nvPr>
         </p:nvSpPr>
-        <p:spPr/>
+        <p:spPr>
+          <a:xfrm>
+            <a:off x="838200" y="1825625"/>
+            <a:ext cx="4572000" cy="4351338"/>
+          </a:xfrm>
+        </p:spPr>
         <p:txBody>
           <a:bodyPr/>
           <a:lstStyle/>
@@ -8526,7 +9816,7 @@
               </a:lnSpc>
             </a:pPr>
             <a:r>
-              <a:rPr lang="en-US" dirty="0"/>
+              <a:rPr lang="en-US" sz="2200" dirty="0"/>
               <a:t>Natural consequence: the low-energy states between drastically different potentials also exhibit universality</a:t>
             </a:r>
           </a:p>
@@ -8537,16 +9827,8 @@
               </a:lnSpc>
             </a:pPr>
             <a:r>
-              <a:rPr lang="en-US" dirty="0"/>
-              <a:t>Figure: \psi(r) with EMN N4LO, RKE N4LO, </a:t>
-            </a:r>
-            <a:r>
-              <a:rPr lang="en-US" dirty="0" err="1"/>
-              <a:t>Gez</a:t>
-            </a:r>
-            <a:r>
-              <a:rPr lang="en-US" dirty="0"/>
-              <a:t>. N2LO, AV18 (need to generate this still)</a:t>
+              <a:rPr lang="en-US" sz="2200" dirty="0"/>
+              <a:t>SRC physics in AV18 is gone (scheme dependence)</a:t>
             </a:r>
           </a:p>
           <a:p>
@@ -8556,8 +9838,8 @@
               </a:lnSpc>
             </a:pPr>
             <a:r>
-              <a:rPr lang="en-US" dirty="0"/>
-              <a:t>SRC physics in AV18 is gone</a:t>
+              <a:rPr lang="en-US" sz="2200" dirty="0"/>
+              <a:t>All deuteron wave functions become soft and D-state probability goes down</a:t>
             </a:r>
           </a:p>
           <a:p>
@@ -8567,8 +9849,8 @@
               </a:lnSpc>
             </a:pPr>
             <a:r>
-              <a:rPr lang="en-US" dirty="0"/>
-              <a:t>All deuteron wave functions become soft and D-state probability goes down</a:t>
+              <a:rPr lang="en-US" sz="2200" dirty="0"/>
+              <a:t>Observables such as asymptotic D/S ratio the same</a:t>
             </a:r>
           </a:p>
           <a:p>
@@ -8578,8 +9860,16 @@
               </a:lnSpc>
             </a:pPr>
             <a:r>
-              <a:rPr lang="en-US" dirty="0"/>
-              <a:t>Observables such as asymptotic D/S ratio the same</a:t>
+              <a:rPr lang="en-US" sz="2200" dirty="0"/>
+              <a:t>(add </a:t>
+            </a:r>
+            <a:r>
+              <a:rPr lang="en-US" sz="2200" dirty="0" err="1"/>
+              <a:t>Gezerlis</a:t>
+            </a:r>
+            <a:r>
+              <a:rPr lang="en-US" sz="2200" dirty="0"/>
+              <a:t> to this plot, S- and D-state arrows)</a:t>
             </a:r>
           </a:p>
           <a:p>
@@ -8588,7 +9878,7 @@
                 <a:spcPct val="100000"/>
               </a:lnSpc>
             </a:pPr>
-            <a:endParaRPr lang="en-US" dirty="0"/>
+            <a:endParaRPr lang="en-US" sz="2200" dirty="0"/>
           </a:p>
           <a:p>
             <a:pPr marL="0" indent="0">
@@ -8603,6 +9893,36 @@
           </a:p>
         </p:txBody>
       </p:sp>
+      <p:pic>
+        <p:nvPicPr>
+          <p:cNvPr id="5" name="Picture 4">
+            <a:extLst>
+              <a:ext uri="{FF2B5EF4-FFF2-40B4-BE49-F238E27FC236}">
+                <a16:creationId xmlns:a16="http://schemas.microsoft.com/office/drawing/2014/main" id="{50CC8E7F-4018-884B-B16C-08B6714402A5}"/>
+              </a:ext>
+            </a:extLst>
+          </p:cNvPr>
+          <p:cNvPicPr>
+            <a:picLocks noChangeAspect="1"/>
+          </p:cNvPicPr>
+          <p:nvPr/>
+        </p:nvPicPr>
+        <p:blipFill>
+          <a:blip r:embed="rId2"/>
+          <a:stretch>
+            <a:fillRect/>
+          </a:stretch>
+        </p:blipFill>
+        <p:spPr>
+          <a:xfrm>
+            <a:off x="5347073" y="2322786"/>
+            <a:ext cx="6844927" cy="3576282"/>
+          </a:xfrm>
+          <a:prstGeom prst="rect">
+            <a:avLst/>
+          </a:prstGeom>
+        </p:spPr>
+      </p:pic>
     </p:spTree>
     <p:extLst>
       <p:ext uri="{BB962C8B-B14F-4D97-AF65-F5344CB8AC3E}">
@@ -8687,7 +10007,12 @@
             <p:ph idx="1"/>
           </p:nvPr>
         </p:nvSpPr>
-        <p:spPr/>
+        <p:spPr>
+          <a:xfrm>
+            <a:off x="838200" y="1825625"/>
+            <a:ext cx="4572000" cy="4351338"/>
+          </a:xfrm>
+        </p:spPr>
         <p:txBody>
           <a:bodyPr/>
           <a:lstStyle/>
@@ -8698,7 +10023,7 @@
               </a:lnSpc>
             </a:pPr>
             <a:r>
-              <a:rPr lang="en-US" dirty="0"/>
+              <a:rPr lang="en-US" sz="2400" dirty="0"/>
               <a:t>Natural consequence: the low-energy states between drastically different potentials also exhibit universality</a:t>
             </a:r>
           </a:p>
@@ -8709,16 +10034,8 @@
               </a:lnSpc>
             </a:pPr>
             <a:r>
-              <a:rPr lang="en-US" dirty="0"/>
-              <a:t>Figure: \psi(r) with EMN N4LO, RKE N4LO, </a:t>
-            </a:r>
-            <a:r>
-              <a:rPr lang="en-US" dirty="0" err="1"/>
-              <a:t>Gez</a:t>
-            </a:r>
-            <a:r>
-              <a:rPr lang="en-US" dirty="0"/>
-              <a:t>. N2LO, AV18 (need to generate this still)</a:t>
+              <a:rPr lang="en-US" sz="2400" dirty="0"/>
+              <a:t>SRC physics in AV18 is gone</a:t>
             </a:r>
           </a:p>
           <a:p>
@@ -8728,8 +10045,8 @@
               </a:lnSpc>
             </a:pPr>
             <a:r>
-              <a:rPr lang="en-US" dirty="0"/>
-              <a:t>SRC physics in AV18 is gone</a:t>
+              <a:rPr lang="en-US" sz="2400" dirty="0"/>
+              <a:t>All deuteron wave functions become soft and D-state probability goes down</a:t>
             </a:r>
           </a:p>
           <a:p>
@@ -8739,18 +10056,7 @@
               </a:lnSpc>
             </a:pPr>
             <a:r>
-              <a:rPr lang="en-US" dirty="0"/>
-              <a:t>All deuteron wave functions become soft and D-state probability goes down</a:t>
-            </a:r>
-          </a:p>
-          <a:p>
-            <a:pPr>
-              <a:lnSpc>
-                <a:spcPct val="100000"/>
-              </a:lnSpc>
-            </a:pPr>
-            <a:r>
-              <a:rPr lang="en-US" dirty="0"/>
+              <a:rPr lang="en-US" sz="2400" dirty="0"/>
               <a:t>Observables such as asymptotic D/S ratio the same</a:t>
             </a:r>
           </a:p>
@@ -8775,10 +10081,40 @@
           </a:p>
         </p:txBody>
       </p:sp>
+      <p:pic>
+        <p:nvPicPr>
+          <p:cNvPr id="5" name="Picture 4">
+            <a:extLst>
+              <a:ext uri="{FF2B5EF4-FFF2-40B4-BE49-F238E27FC236}">
+                <a16:creationId xmlns:a16="http://schemas.microsoft.com/office/drawing/2014/main" id="{50CC8E7F-4018-884B-B16C-08B6714402A5}"/>
+              </a:ext>
+            </a:extLst>
+          </p:cNvPr>
+          <p:cNvPicPr>
+            <a:picLocks noChangeAspect="1"/>
+          </p:cNvPicPr>
+          <p:nvPr/>
+        </p:nvPicPr>
+        <p:blipFill>
+          <a:blip r:embed="rId2"/>
+          <a:stretch>
+            <a:fillRect/>
+          </a:stretch>
+        </p:blipFill>
+        <p:spPr>
+          <a:xfrm>
+            <a:off x="5410200" y="2229644"/>
+            <a:ext cx="6781800" cy="3543300"/>
+          </a:xfrm>
+          <a:prstGeom prst="rect">
+            <a:avLst/>
+          </a:prstGeom>
+        </p:spPr>
+      </p:pic>
     </p:spTree>
     <p:extLst>
       <p:ext uri="{BB962C8B-B14F-4D97-AF65-F5344CB8AC3E}">
-        <p14:creationId xmlns:p14="http://schemas.microsoft.com/office/powerpoint/2010/main" val="1037284366"/>
+        <p14:creationId xmlns:p14="http://schemas.microsoft.com/office/powerpoint/2010/main" val="3242946470"/>
       </p:ext>
     </p:extLst>
   </p:cSld>
@@ -8859,7 +10195,12 @@
             <p:ph idx="1"/>
           </p:nvPr>
         </p:nvSpPr>
-        <p:spPr/>
+        <p:spPr>
+          <a:xfrm>
+            <a:off x="838200" y="1825625"/>
+            <a:ext cx="4572000" cy="4351338"/>
+          </a:xfrm>
+        </p:spPr>
         <p:txBody>
           <a:bodyPr/>
           <a:lstStyle/>
@@ -8870,7 +10211,7 @@
               </a:lnSpc>
             </a:pPr>
             <a:r>
-              <a:rPr lang="en-US" dirty="0"/>
+              <a:rPr lang="en-US" sz="2400" dirty="0"/>
               <a:t>Natural consequence: the low-energy states between drastically different potentials also exhibit universality</a:t>
             </a:r>
           </a:p>
@@ -8881,16 +10222,8 @@
               </a:lnSpc>
             </a:pPr>
             <a:r>
-              <a:rPr lang="en-US" dirty="0"/>
-              <a:t>Figure: \psi(r) with EMN N4LO, RKE N4LO, </a:t>
-            </a:r>
-            <a:r>
-              <a:rPr lang="en-US" dirty="0" err="1"/>
-              <a:t>Gez</a:t>
-            </a:r>
-            <a:r>
-              <a:rPr lang="en-US" dirty="0"/>
-              <a:t>. N2LO, AV18 (need to generate this still)</a:t>
+              <a:rPr lang="en-US" sz="2400" dirty="0"/>
+              <a:t>SRC physics in AV18 is gone</a:t>
             </a:r>
           </a:p>
           <a:p>
@@ -8900,8 +10233,8 @@
               </a:lnSpc>
             </a:pPr>
             <a:r>
-              <a:rPr lang="en-US" dirty="0"/>
-              <a:t>SRC physics in AV18 is gone</a:t>
+              <a:rPr lang="en-US" sz="2400" dirty="0"/>
+              <a:t>All deuteron wave functions become soft and D-state probability goes down</a:t>
             </a:r>
           </a:p>
           <a:p>
@@ -8911,18 +10244,7 @@
               </a:lnSpc>
             </a:pPr>
             <a:r>
-              <a:rPr lang="en-US" dirty="0"/>
-              <a:t>All deuteron wave functions become soft and D-state probability goes down</a:t>
-            </a:r>
-          </a:p>
-          <a:p>
-            <a:pPr>
-              <a:lnSpc>
-                <a:spcPct val="100000"/>
-              </a:lnSpc>
-            </a:pPr>
-            <a:r>
-              <a:rPr lang="en-US" dirty="0"/>
+              <a:rPr lang="en-US" sz="2400" dirty="0"/>
               <a:t>Observables such as asymptotic D/S ratio the same</a:t>
             </a:r>
           </a:p>
@@ -8947,10 +10269,40 @@
           </a:p>
         </p:txBody>
       </p:sp>
+      <p:pic>
+        <p:nvPicPr>
+          <p:cNvPr id="5" name="Picture 4">
+            <a:extLst>
+              <a:ext uri="{FF2B5EF4-FFF2-40B4-BE49-F238E27FC236}">
+                <a16:creationId xmlns:a16="http://schemas.microsoft.com/office/drawing/2014/main" id="{50CC8E7F-4018-884B-B16C-08B6714402A5}"/>
+              </a:ext>
+            </a:extLst>
+          </p:cNvPr>
+          <p:cNvPicPr>
+            <a:picLocks noChangeAspect="1"/>
+          </p:cNvPicPr>
+          <p:nvPr/>
+        </p:nvPicPr>
+        <p:blipFill>
+          <a:blip r:embed="rId2"/>
+          <a:stretch>
+            <a:fillRect/>
+          </a:stretch>
+        </p:blipFill>
+        <p:spPr>
+          <a:xfrm>
+            <a:off x="5410200" y="2229644"/>
+            <a:ext cx="6781800" cy="3543300"/>
+          </a:xfrm>
+          <a:prstGeom prst="rect">
+            <a:avLst/>
+          </a:prstGeom>
+        </p:spPr>
+      </p:pic>
     </p:spTree>
     <p:extLst>
       <p:ext uri="{BB962C8B-B14F-4D97-AF65-F5344CB8AC3E}">
-        <p14:creationId xmlns:p14="http://schemas.microsoft.com/office/powerpoint/2010/main" val="4010055520"/>
+        <p14:creationId xmlns:p14="http://schemas.microsoft.com/office/powerpoint/2010/main" val="4257027843"/>
       </p:ext>
     </p:extLst>
   </p:cSld>

</xml_diff>

<commit_message>
Starting draft of DNP 2020 presentation
Using some slides from previous NUCLEI 2020 talk.
</commit_message>
<xml_diff>
--- a/Presentations/NUCLEI_June2020/tropiano_nuclei_2020.pptx
+++ b/Presentations/NUCLEI_June2020/tropiano_nuclei_2020.pptx
@@ -240,7 +240,7 @@
             <a:fld id="{0A84EC41-ECD6-7F4B-B508-87B276563826}" type="datetimeFigureOut">
               <a:rPr lang="en-US" smtClean="0"/>
               <a:pPr/>
-              <a:t>6/9/20</a:t>
+              <a:t>10/21/20</a:t>
             </a:fld>
             <a:endParaRPr lang="en-US" dirty="0"/>
           </a:p>
@@ -952,7 +952,7 @@
           <a:p>
             <a:fld id="{C3DAB034-3E69-C74A-A1B2-01597DB1B319}" type="datetime1">
               <a:rPr lang="en-US" smtClean="0"/>
-              <a:t>6/9/20</a:t>
+              <a:t>10/21/20</a:t>
             </a:fld>
             <a:endParaRPr lang="en-US"/>
           </a:p>
@@ -1150,7 +1150,7 @@
           <a:p>
             <a:fld id="{6843452F-8DB3-B94F-A029-4C1F744B0F07}" type="datetime1">
               <a:rPr lang="en-US" smtClean="0"/>
-              <a:t>6/9/20</a:t>
+              <a:t>10/21/20</a:t>
             </a:fld>
             <a:endParaRPr lang="en-US"/>
           </a:p>
@@ -1358,7 +1358,7 @@
           <a:p>
             <a:fld id="{A03CF1D7-886B-3F42-AD05-1608A08018BE}" type="datetime1">
               <a:rPr lang="en-US" smtClean="0"/>
-              <a:t>6/9/20</a:t>
+              <a:t>10/21/20</a:t>
             </a:fld>
             <a:endParaRPr lang="en-US"/>
           </a:p>
@@ -1556,7 +1556,7 @@
           <a:p>
             <a:fld id="{17472CCF-9B47-4A41-91F6-0E2B23F36AAB}" type="datetime1">
               <a:rPr lang="en-US" smtClean="0"/>
-              <a:t>6/9/20</a:t>
+              <a:t>10/21/20</a:t>
             </a:fld>
             <a:endParaRPr lang="en-US"/>
           </a:p>
@@ -1831,7 +1831,7 @@
           <a:p>
             <a:fld id="{EF4215EA-7A9A-4144-B03C-A86AEEA97527}" type="datetime1">
               <a:rPr lang="en-US" smtClean="0"/>
-              <a:t>6/9/20</a:t>
+              <a:t>10/21/20</a:t>
             </a:fld>
             <a:endParaRPr lang="en-US"/>
           </a:p>
@@ -2096,7 +2096,7 @@
           <a:p>
             <a:fld id="{662B367E-89A7-5E42-A498-EE3D5D0F1198}" type="datetime1">
               <a:rPr lang="en-US" smtClean="0"/>
-              <a:t>6/9/20</a:t>
+              <a:t>10/21/20</a:t>
             </a:fld>
             <a:endParaRPr lang="en-US"/>
           </a:p>
@@ -2508,7 +2508,7 @@
           <a:p>
             <a:fld id="{3B2216CE-E836-1043-9DC8-4C36A5C1829B}" type="datetime1">
               <a:rPr lang="en-US" smtClean="0"/>
-              <a:t>6/9/20</a:t>
+              <a:t>10/21/20</a:t>
             </a:fld>
             <a:endParaRPr lang="en-US"/>
           </a:p>
@@ -2649,7 +2649,7 @@
           <a:p>
             <a:fld id="{1FAA158F-1B00-3D4E-8AF2-BD6172DBDAA5}" type="datetime1">
               <a:rPr lang="en-US" smtClean="0"/>
-              <a:t>6/9/20</a:t>
+              <a:t>10/21/20</a:t>
             </a:fld>
             <a:endParaRPr lang="en-US"/>
           </a:p>
@@ -2762,7 +2762,7 @@
           <a:p>
             <a:fld id="{E1D3A21D-6889-D64C-84A6-D4BC8E252167}" type="datetime1">
               <a:rPr lang="en-US" smtClean="0"/>
-              <a:t>6/9/20</a:t>
+              <a:t>10/21/20</a:t>
             </a:fld>
             <a:endParaRPr lang="en-US"/>
           </a:p>
@@ -3073,7 +3073,7 @@
           <a:p>
             <a:fld id="{409E93FA-3FCF-8E47-B69F-79113DC2AE7A}" type="datetime1">
               <a:rPr lang="en-US" smtClean="0"/>
-              <a:t>6/9/20</a:t>
+              <a:t>10/21/20</a:t>
             </a:fld>
             <a:endParaRPr lang="en-US"/>
           </a:p>
@@ -3364,7 +3364,7 @@
           <a:p>
             <a:fld id="{14D10797-6BD5-0E44-B67C-4E69A67DCC0A}" type="datetime1">
               <a:rPr lang="en-US" smtClean="0"/>
-              <a:t>6/9/20</a:t>
+              <a:t>10/21/20</a:t>
             </a:fld>
             <a:endParaRPr lang="en-US"/>
           </a:p>
@@ -3608,7 +3608,7 @@
           <a:p>
             <a:fld id="{06EA9EDC-532F-E64E-8A7D-9DECB7BED5F7}" type="datetime1">
               <a:rPr lang="en-US" smtClean="0"/>
-              <a:t>6/9/20</a:t>
+              <a:t>10/21/20</a:t>
             </a:fld>
             <a:endParaRPr lang="en-US" dirty="0"/>
           </a:p>
@@ -7527,8 +7527,8 @@
           </a:p>
         </p:txBody>
       </p:sp>
-      <mc:AlternateContent xmlns:mc="http://schemas.openxmlformats.org/markup-compatibility/2006">
-        <mc:Choice xmlns:a14="http://schemas.microsoft.com/office/drawing/2010/main" Requires="a14">
+      <mc:AlternateContent xmlns:mc="http://schemas.openxmlformats.org/markup-compatibility/2006" xmlns:a14="http://schemas.microsoft.com/office/drawing/2010/main">
+        <mc:Choice Requires="a14">
           <p:sp>
             <p:nvSpPr>
               <p:cNvPr id="3" name="Content Placeholder 2">
@@ -7722,7 +7722,7 @@
             </p:txBody>
           </p:sp>
         </mc:Choice>
-        <mc:Fallback>
+        <mc:Fallback xmlns="">
           <p:sp>
             <p:nvSpPr>
               <p:cNvPr id="3" name="Content Placeholder 2">
@@ -7864,8 +7864,8 @@
           </a:p>
         </p:txBody>
       </p:sp>
-      <mc:AlternateContent xmlns:mc="http://schemas.openxmlformats.org/markup-compatibility/2006">
-        <mc:Choice xmlns:a14="http://schemas.microsoft.com/office/drawing/2010/main" Requires="a14">
+      <mc:AlternateContent xmlns:mc="http://schemas.openxmlformats.org/markup-compatibility/2006" xmlns:a14="http://schemas.microsoft.com/office/drawing/2010/main">
+        <mc:Choice Requires="a14">
           <p:sp>
             <p:nvSpPr>
               <p:cNvPr id="3" name="Content Placeholder 2">
@@ -8070,7 +8070,7 @@
             </p:txBody>
           </p:sp>
         </mc:Choice>
-        <mc:Fallback>
+        <mc:Fallback xmlns="">
           <p:sp>
             <p:nvSpPr>
               <p:cNvPr id="3" name="Content Placeholder 2">
@@ -8207,8 +8207,8 @@
           </a:p>
         </p:txBody>
       </p:sp>
-      <mc:AlternateContent xmlns:mc="http://schemas.openxmlformats.org/markup-compatibility/2006">
-        <mc:Choice xmlns:a14="http://schemas.microsoft.com/office/drawing/2010/main" Requires="a14">
+      <mc:AlternateContent xmlns:mc="http://schemas.openxmlformats.org/markup-compatibility/2006" xmlns:a14="http://schemas.microsoft.com/office/drawing/2010/main">
+        <mc:Choice Requires="a14">
           <p:sp>
             <p:nvSpPr>
               <p:cNvPr id="3" name="Content Placeholder 2">
@@ -8811,7 +8811,7 @@
             </p:txBody>
           </p:sp>
         </mc:Choice>
-        <mc:Fallback>
+        <mc:Fallback xmlns="">
           <p:sp>
             <p:nvSpPr>
               <p:cNvPr id="3" name="Content Placeholder 2">
@@ -10958,8 +10958,8 @@
           </p:sp>
         </mc:Fallback>
       </mc:AlternateContent>
-      <mc:AlternateContent xmlns:mc="http://schemas.openxmlformats.org/markup-compatibility/2006">
-        <mc:Choice xmlns:a14="http://schemas.microsoft.com/office/drawing/2010/main" Requires="a14">
+      <mc:AlternateContent xmlns:mc="http://schemas.openxmlformats.org/markup-compatibility/2006" xmlns:a14="http://schemas.microsoft.com/office/drawing/2010/main">
+        <mc:Choice Requires="a14">
           <p:sp>
             <p:nvSpPr>
               <p:cNvPr id="3" name="Content Placeholder 2">
@@ -11092,7 +11092,7 @@
             </p:txBody>
           </p:sp>
         </mc:Choice>
-        <mc:Fallback>
+        <mc:Fallback xmlns="">
           <p:sp>
             <p:nvSpPr>
               <p:cNvPr id="3" name="Content Placeholder 2">
@@ -11748,8 +11748,8 @@
           </p:sp>
         </mc:Fallback>
       </mc:AlternateContent>
-      <mc:AlternateContent xmlns:mc="http://schemas.openxmlformats.org/markup-compatibility/2006">
-        <mc:Choice xmlns:a14="http://schemas.microsoft.com/office/drawing/2010/main" Requires="a14">
+      <mc:AlternateContent xmlns:mc="http://schemas.openxmlformats.org/markup-compatibility/2006" xmlns:a14="http://schemas.microsoft.com/office/drawing/2010/main">
+        <mc:Choice Requires="a14">
           <p:sp>
             <p:nvSpPr>
               <p:cNvPr id="3" name="Content Placeholder 2">
@@ -12242,7 +12242,7 @@
             </p:txBody>
           </p:sp>
         </mc:Choice>
-        <mc:Fallback>
+        <mc:Fallback xmlns="">
           <p:sp>
             <p:nvSpPr>
               <p:cNvPr id="3" name="Content Placeholder 2">
@@ -14812,8 +14812,8 @@
           </a:p>
         </p:txBody>
       </p:sp>
-      <mc:AlternateContent xmlns:mc="http://schemas.openxmlformats.org/markup-compatibility/2006">
-        <mc:Choice xmlns:a14="http://schemas.microsoft.com/office/drawing/2010/main" Requires="a14">
+      <mc:AlternateContent xmlns:mc="http://schemas.openxmlformats.org/markup-compatibility/2006" xmlns:a14="http://schemas.microsoft.com/office/drawing/2010/main">
+        <mc:Choice Requires="a14">
           <p:sp>
             <p:nvSpPr>
               <p:cNvPr id="8" name="TextBox 7">
@@ -15002,7 +15002,7 @@
             </p:txBody>
           </p:sp>
         </mc:Choice>
-        <mc:Fallback>
+        <mc:Fallback xmlns="">
           <p:sp>
             <p:nvSpPr>
               <p:cNvPr id="8" name="TextBox 7">
@@ -15474,8 +15474,8 @@
           </a:p>
         </p:txBody>
       </p:sp>
-      <mc:AlternateContent xmlns:mc="http://schemas.openxmlformats.org/markup-compatibility/2006">
-        <mc:Choice xmlns:a14="http://schemas.microsoft.com/office/drawing/2010/main" Requires="a14">
+      <mc:AlternateContent xmlns:mc="http://schemas.openxmlformats.org/markup-compatibility/2006" xmlns:a14="http://schemas.microsoft.com/office/drawing/2010/main">
+        <mc:Choice Requires="a14">
           <p:sp>
             <p:nvSpPr>
               <p:cNvPr id="3" name="Content Placeholder 2">
@@ -15614,7 +15614,7 @@
             </p:txBody>
           </p:sp>
         </mc:Choice>
-        <mc:Fallback>
+        <mc:Fallback xmlns="">
           <p:sp>
             <p:nvSpPr>
               <p:cNvPr id="3" name="Content Placeholder 2">

</xml_diff>